<commit_message>
week17: - add ndn folder -update material except(1.optical communication 2.advanced network)
</commit_message>
<xml_diff>
--- a/Networked System and Applications/week 14/EENGM0009-1-10-Transport Layer-TCP Throughput and Fairness(1).pptx
+++ b/Networked System and Applications/week 14/EENGM0009-1-10-Transport Layer-TCP Throughput and Fairness(1).pptx
@@ -817,14 +817,14 @@
           <a:effectLst/>
           <a:extLst>
             <a:ext uri="{909E8E84-426E-40dd-AFC4-6F175D3DCCD1}">
-              <a14:hiddenFill xmlns="" xmlns:a14="http://schemas.microsoft.com/office/drawing/2010/main">
+              <a14:hiddenFill xmlns:a14="http://schemas.microsoft.com/office/drawing/2010/main" xmlns="">
                 <a:solidFill>
                   <a:srgbClr val="FFFFFF"/>
                 </a:solidFill>
               </a14:hiddenFill>
             </a:ext>
             <a:ext uri="{91240B29-F687-4f45-9708-019B960494DF}">
-              <a14:hiddenLine xmlns="" xmlns:a14="http://schemas.microsoft.com/office/drawing/2010/main" w="9525">
+              <a14:hiddenLine xmlns:a14="http://schemas.microsoft.com/office/drawing/2010/main" xmlns="" w="9525">
                 <a:solidFill>
                   <a:schemeClr val="tx1"/>
                 </a:solidFill>
@@ -834,7 +834,7 @@
               </a14:hiddenLine>
             </a:ext>
             <a:ext uri="{AF507438-7753-43e0-B8FC-AC1667EBCBE1}">
-              <a14:hiddenEffects xmlns="" xmlns:a14="http://schemas.microsoft.com/office/drawing/2010/main">
+              <a14:hiddenEffects xmlns:a14="http://schemas.microsoft.com/office/drawing/2010/main" xmlns="">
                 <a:effectLst>
                   <a:outerShdw dist="35921" dir="2700000" algn="ctr" rotWithShape="0">
                     <a:schemeClr val="bg2"/>
@@ -892,14 +892,14 @@
           <a:effectLst/>
           <a:extLst>
             <a:ext uri="{909E8E84-426E-40dd-AFC4-6F175D3DCCD1}">
-              <a14:hiddenFill xmlns="" xmlns:a14="http://schemas.microsoft.com/office/drawing/2010/main">
+              <a14:hiddenFill xmlns:a14="http://schemas.microsoft.com/office/drawing/2010/main" xmlns="">
                 <a:solidFill>
                   <a:srgbClr val="FFFFFF"/>
                 </a:solidFill>
               </a14:hiddenFill>
             </a:ext>
             <a:ext uri="{91240B29-F687-4f45-9708-019B960494DF}">
-              <a14:hiddenLine xmlns="" xmlns:a14="http://schemas.microsoft.com/office/drawing/2010/main" w="9525">
+              <a14:hiddenLine xmlns:a14="http://schemas.microsoft.com/office/drawing/2010/main" xmlns="" w="9525">
                 <a:solidFill>
                   <a:schemeClr val="tx1"/>
                 </a:solidFill>
@@ -909,7 +909,7 @@
               </a14:hiddenLine>
             </a:ext>
             <a:ext uri="{AF507438-7753-43e0-B8FC-AC1667EBCBE1}">
-              <a14:hiddenEffects xmlns="" xmlns:a14="http://schemas.microsoft.com/office/drawing/2010/main">
+              <a14:hiddenEffects xmlns:a14="http://schemas.microsoft.com/office/drawing/2010/main" xmlns="">
                 <a:effectLst>
                   <a:outerShdw dist="35921" dir="2700000" algn="ctr" rotWithShape="0">
                     <a:schemeClr val="bg2"/>
@@ -967,14 +967,14 @@
           <a:effectLst/>
           <a:extLst>
             <a:ext uri="{909E8E84-426E-40dd-AFC4-6F175D3DCCD1}">
-              <a14:hiddenFill xmlns="" xmlns:a14="http://schemas.microsoft.com/office/drawing/2010/main">
+              <a14:hiddenFill xmlns:a14="http://schemas.microsoft.com/office/drawing/2010/main" xmlns="">
                 <a:solidFill>
                   <a:srgbClr val="FFFFFF"/>
                 </a:solidFill>
               </a14:hiddenFill>
             </a:ext>
             <a:ext uri="{91240B29-F687-4f45-9708-019B960494DF}">
-              <a14:hiddenLine xmlns="" xmlns:a14="http://schemas.microsoft.com/office/drawing/2010/main" w="9525">
+              <a14:hiddenLine xmlns:a14="http://schemas.microsoft.com/office/drawing/2010/main" xmlns="" w="9525">
                 <a:solidFill>
                   <a:schemeClr val="tx1"/>
                 </a:solidFill>
@@ -984,7 +984,7 @@
               </a14:hiddenLine>
             </a:ext>
             <a:ext uri="{AF507438-7753-43e0-B8FC-AC1667EBCBE1}">
-              <a14:hiddenEffects xmlns="" xmlns:a14="http://schemas.microsoft.com/office/drawing/2010/main">
+              <a14:hiddenEffects xmlns:a14="http://schemas.microsoft.com/office/drawing/2010/main" xmlns="">
                 <a:effectLst>
                   <a:outerShdw dist="35921" dir="2700000" algn="ctr" rotWithShape="0">
                     <a:schemeClr val="bg2"/>
@@ -1042,14 +1042,14 @@
           <a:effectLst/>
           <a:extLst>
             <a:ext uri="{909E8E84-426E-40dd-AFC4-6F175D3DCCD1}">
-              <a14:hiddenFill xmlns="" xmlns:a14="http://schemas.microsoft.com/office/drawing/2010/main">
+              <a14:hiddenFill xmlns:a14="http://schemas.microsoft.com/office/drawing/2010/main" xmlns="">
                 <a:solidFill>
                   <a:srgbClr val="FFFFFF"/>
                 </a:solidFill>
               </a14:hiddenFill>
             </a:ext>
             <a:ext uri="{91240B29-F687-4f45-9708-019B960494DF}">
-              <a14:hiddenLine xmlns="" xmlns:a14="http://schemas.microsoft.com/office/drawing/2010/main" w="9525">
+              <a14:hiddenLine xmlns:a14="http://schemas.microsoft.com/office/drawing/2010/main" xmlns="" w="9525">
                 <a:solidFill>
                   <a:schemeClr val="tx1"/>
                 </a:solidFill>
@@ -1059,7 +1059,7 @@
               </a14:hiddenLine>
             </a:ext>
             <a:ext uri="{AF507438-7753-43e0-B8FC-AC1667EBCBE1}">
-              <a14:hiddenEffects xmlns="" xmlns:a14="http://schemas.microsoft.com/office/drawing/2010/main">
+              <a14:hiddenEffects xmlns:a14="http://schemas.microsoft.com/office/drawing/2010/main" xmlns="">
                 <a:effectLst>
                   <a:outerShdw dist="35921" dir="2700000" algn="ctr" rotWithShape="0">
                     <a:schemeClr val="bg2"/>
@@ -1159,14 +1159,14 @@
           <a:effectLst/>
           <a:extLst>
             <a:ext uri="{909E8E84-426E-40dd-AFC4-6F175D3DCCD1}">
-              <a14:hiddenFill xmlns="" xmlns:a14="http://schemas.microsoft.com/office/drawing/2010/main">
+              <a14:hiddenFill xmlns:a14="http://schemas.microsoft.com/office/drawing/2010/main" xmlns="">
                 <a:solidFill>
                   <a:schemeClr val="accent1"/>
                 </a:solidFill>
               </a14:hiddenFill>
             </a:ext>
             <a:ext uri="{91240B29-F687-4f45-9708-019B960494DF}">
-              <a14:hiddenLine xmlns="" xmlns:a14="http://schemas.microsoft.com/office/drawing/2010/main" w="9525">
+              <a14:hiddenLine xmlns:a14="http://schemas.microsoft.com/office/drawing/2010/main" xmlns="" w="9525">
                 <a:solidFill>
                   <a:schemeClr val="tx1"/>
                 </a:solidFill>
@@ -1176,7 +1176,7 @@
               </a14:hiddenLine>
             </a:ext>
             <a:ext uri="{AF507438-7753-43e0-B8FC-AC1667EBCBE1}">
-              <a14:hiddenEffects xmlns="" xmlns:a14="http://schemas.microsoft.com/office/drawing/2010/main">
+              <a14:hiddenEffects xmlns:a14="http://schemas.microsoft.com/office/drawing/2010/main" xmlns="">
                 <a:effectLst>
                   <a:outerShdw dist="35921" dir="2700000" algn="ctr" rotWithShape="0">
                     <a:schemeClr val="bg2"/>
@@ -1234,14 +1234,14 @@
           <a:effectLst/>
           <a:extLst>
             <a:ext uri="{909E8E84-426E-40dd-AFC4-6F175D3DCCD1}">
-              <a14:hiddenFill xmlns="" xmlns:a14="http://schemas.microsoft.com/office/drawing/2010/main">
+              <a14:hiddenFill xmlns:a14="http://schemas.microsoft.com/office/drawing/2010/main" xmlns="">
                 <a:solidFill>
                   <a:schemeClr val="accent1"/>
                 </a:solidFill>
               </a14:hiddenFill>
             </a:ext>
             <a:ext uri="{91240B29-F687-4f45-9708-019B960494DF}">
-              <a14:hiddenLine xmlns="" xmlns:a14="http://schemas.microsoft.com/office/drawing/2010/main" w="9525">
+              <a14:hiddenLine xmlns:a14="http://schemas.microsoft.com/office/drawing/2010/main" xmlns="" w="9525">
                 <a:solidFill>
                   <a:schemeClr val="tx1"/>
                 </a:solidFill>
@@ -1251,7 +1251,7 @@
               </a14:hiddenLine>
             </a:ext>
             <a:ext uri="{AF507438-7753-43e0-B8FC-AC1667EBCBE1}">
-              <a14:hiddenEffects xmlns="" xmlns:a14="http://schemas.microsoft.com/office/drawing/2010/main">
+              <a14:hiddenEffects xmlns:a14="http://schemas.microsoft.com/office/drawing/2010/main" xmlns="">
                 <a:effectLst>
                   <a:outerShdw dist="35921" dir="2700000" algn="ctr" rotWithShape="0">
                     <a:schemeClr val="bg2"/>
@@ -1314,17 +1314,17 @@
           <a:effectLst/>
           <a:extLst>
             <a:ext uri="{FAA26D3D-D897-4be2-8F04-BA451C77F1D7}">
-              <ma14:placeholderFlag xmlns:ma14="http://schemas.microsoft.com/office/mac/drawingml/2011/main" xmlns="" val="1"/>
+              <ma14:placeholderFlag xmlns="" xmlns:ma14="http://schemas.microsoft.com/office/mac/drawingml/2011/main" val="1"/>
             </a:ext>
             <a:ext uri="{909E8E84-426E-40dd-AFC4-6F175D3DCCD1}">
-              <a14:hiddenFill xmlns="" xmlns:a14="http://schemas.microsoft.com/office/drawing/2010/main">
+              <a14:hiddenFill xmlns:a14="http://schemas.microsoft.com/office/drawing/2010/main" xmlns="">
                 <a:solidFill>
                   <a:srgbClr val="FFFFFF"/>
                 </a:solidFill>
               </a14:hiddenFill>
             </a:ext>
             <a:ext uri="{AF507438-7753-43e0-B8FC-AC1667EBCBE1}">
-              <a14:hiddenEffects xmlns="" xmlns:a14="http://schemas.microsoft.com/office/drawing/2010/main">
+              <a14:hiddenEffects xmlns:a14="http://schemas.microsoft.com/office/drawing/2010/main" xmlns="">
                 <a:effectLst>
                   <a:outerShdw blurRad="63500" dist="38099" dir="2700000" algn="ctr" rotWithShape="0">
                     <a:srgbClr val="000000">
@@ -1335,7 +1335,7 @@
               </a14:hiddenEffects>
             </a:ext>
             <a:ext uri="{53640926-AAD7-44d8-BBD7-CCE9431645EC}">
-              <a14:shadowObscured xmlns="" xmlns:a14="http://schemas.microsoft.com/office/drawing/2010/main" val="1"/>
+              <a14:shadowObscured xmlns:a14="http://schemas.microsoft.com/office/drawing/2010/main" xmlns="" val="1"/>
             </a:ext>
           </a:extLst>
         </p:spPr>
@@ -1365,14 +1365,14 @@
           <a:effectLst/>
           <a:extLst>
             <a:ext uri="{909E8E84-426E-40dd-AFC4-6F175D3DCCD1}">
-              <a14:hiddenFill xmlns="" xmlns:a14="http://schemas.microsoft.com/office/drawing/2010/main">
+              <a14:hiddenFill xmlns:a14="http://schemas.microsoft.com/office/drawing/2010/main" xmlns="">
                 <a:solidFill>
                   <a:schemeClr val="accent1"/>
                 </a:solidFill>
               </a14:hiddenFill>
             </a:ext>
             <a:ext uri="{91240B29-F687-4f45-9708-019B960494DF}">
-              <a14:hiddenLine xmlns="" xmlns:a14="http://schemas.microsoft.com/office/drawing/2010/main" w="9525">
+              <a14:hiddenLine xmlns:a14="http://schemas.microsoft.com/office/drawing/2010/main" xmlns="" w="9525">
                 <a:solidFill>
                   <a:schemeClr val="tx1"/>
                 </a:solidFill>
@@ -1382,7 +1382,7 @@
               </a14:hiddenLine>
             </a:ext>
             <a:ext uri="{AF507438-7753-43e0-B8FC-AC1667EBCBE1}">
-              <a14:hiddenEffects xmlns="" xmlns:a14="http://schemas.microsoft.com/office/drawing/2010/main">
+              <a14:hiddenEffects xmlns:a14="http://schemas.microsoft.com/office/drawing/2010/main" xmlns="">
                 <a:effectLst>
                   <a:outerShdw dist="35921" dir="2700000" algn="ctr" rotWithShape="0">
                     <a:schemeClr val="bg2"/>
@@ -1461,14 +1461,14 @@
           <a:effectLst/>
           <a:extLst>
             <a:ext uri="{909E8E84-426E-40dd-AFC4-6F175D3DCCD1}">
-              <a14:hiddenFill xmlns="" xmlns:a14="http://schemas.microsoft.com/office/drawing/2010/main">
+              <a14:hiddenFill xmlns:a14="http://schemas.microsoft.com/office/drawing/2010/main" xmlns="">
                 <a:solidFill>
                   <a:schemeClr val="accent1"/>
                 </a:solidFill>
               </a14:hiddenFill>
             </a:ext>
             <a:ext uri="{91240B29-F687-4f45-9708-019B960494DF}">
-              <a14:hiddenLine xmlns="" xmlns:a14="http://schemas.microsoft.com/office/drawing/2010/main" w="9525">
+              <a14:hiddenLine xmlns:a14="http://schemas.microsoft.com/office/drawing/2010/main" xmlns="" w="9525">
                 <a:solidFill>
                   <a:schemeClr val="tx1"/>
                 </a:solidFill>
@@ -1478,7 +1478,7 @@
               </a14:hiddenLine>
             </a:ext>
             <a:ext uri="{AF507438-7753-43e0-B8FC-AC1667EBCBE1}">
-              <a14:hiddenEffects xmlns="" xmlns:a14="http://schemas.microsoft.com/office/drawing/2010/main">
+              <a14:hiddenEffects xmlns:a14="http://schemas.microsoft.com/office/drawing/2010/main" xmlns="">
                 <a:effectLst>
                   <a:outerShdw dist="35921" dir="2700000" algn="ctr" rotWithShape="0">
                     <a:schemeClr val="bg2"/>
@@ -1536,14 +1536,14 @@
           <a:effectLst/>
           <a:extLst>
             <a:ext uri="{909E8E84-426E-40dd-AFC4-6F175D3DCCD1}">
-              <a14:hiddenFill xmlns="" xmlns:a14="http://schemas.microsoft.com/office/drawing/2010/main">
+              <a14:hiddenFill xmlns:a14="http://schemas.microsoft.com/office/drawing/2010/main" xmlns="">
                 <a:solidFill>
                   <a:schemeClr val="accent1"/>
                 </a:solidFill>
               </a14:hiddenFill>
             </a:ext>
             <a:ext uri="{91240B29-F687-4f45-9708-019B960494DF}">
-              <a14:hiddenLine xmlns="" xmlns:a14="http://schemas.microsoft.com/office/drawing/2010/main" w="9525">
+              <a14:hiddenLine xmlns:a14="http://schemas.microsoft.com/office/drawing/2010/main" xmlns="" w="9525">
                 <a:solidFill>
                   <a:schemeClr val="tx1"/>
                 </a:solidFill>
@@ -1553,7 +1553,7 @@
               </a14:hiddenLine>
             </a:ext>
             <a:ext uri="{AF507438-7753-43e0-B8FC-AC1667EBCBE1}">
-              <a14:hiddenEffects xmlns="" xmlns:a14="http://schemas.microsoft.com/office/drawing/2010/main">
+              <a14:hiddenEffects xmlns:a14="http://schemas.microsoft.com/office/drawing/2010/main" xmlns="">
                 <a:effectLst>
                   <a:outerShdw dist="35921" dir="2700000" algn="ctr" rotWithShape="0">
                     <a:schemeClr val="bg2"/>
@@ -1771,14 +1771,14 @@
           <a:ln w="9525"/>
           <a:extLst>
             <a:ext uri="{909E8E84-426E-40dd-AFC4-6F175D3DCCD1}">
-              <a14:hiddenFill xmlns="" xmlns:a14="http://schemas.microsoft.com/office/drawing/2010/main">
+              <a14:hiddenFill xmlns:a14="http://schemas.microsoft.com/office/drawing/2010/main" xmlns="">
                 <a:solidFill>
                   <a:srgbClr val="FFFFFF"/>
                 </a:solidFill>
               </a14:hiddenFill>
             </a:ext>
             <a:ext uri="{91240B29-F687-4f45-9708-019B960494DF}">
-              <a14:hiddenLine xmlns="" xmlns:a14="http://schemas.microsoft.com/office/drawing/2010/main" w="9525">
+              <a14:hiddenLine xmlns:a14="http://schemas.microsoft.com/office/drawing/2010/main" xmlns="" w="9525">
                 <a:solidFill>
                   <a:srgbClr val="000000"/>
                 </a:solidFill>
@@ -8605,17 +8605,17 @@
           <a:effectLst/>
           <a:extLst>
             <a:ext uri="{FAA26D3D-D897-4be2-8F04-BA451C77F1D7}">
-              <ma14:placeholderFlag xmlns:ma14="http://schemas.microsoft.com/office/mac/drawingml/2011/main" xmlns="" val="1"/>
+              <ma14:placeholderFlag xmlns="" xmlns:ma14="http://schemas.microsoft.com/office/mac/drawingml/2011/main" val="1"/>
             </a:ext>
             <a:ext uri="{909E8E84-426E-40dd-AFC4-6F175D3DCCD1}">
-              <a14:hiddenFill xmlns="" xmlns:a14="http://schemas.microsoft.com/office/drawing/2010/main">
+              <a14:hiddenFill xmlns:a14="http://schemas.microsoft.com/office/drawing/2010/main" xmlns="">
                 <a:solidFill>
                   <a:schemeClr val="accent1"/>
                 </a:solidFill>
               </a14:hiddenFill>
             </a:ext>
             <a:ext uri="{91240B29-F687-4f45-9708-019B960494DF}">
-              <a14:hiddenLine xmlns="" xmlns:a14="http://schemas.microsoft.com/office/drawing/2010/main" w="9525">
+              <a14:hiddenLine xmlns:a14="http://schemas.microsoft.com/office/drawing/2010/main" xmlns="" w="9525">
                 <a:solidFill>
                   <a:schemeClr val="tx1"/>
                 </a:solidFill>
@@ -8625,7 +8625,7 @@
               </a14:hiddenLine>
             </a:ext>
             <a:ext uri="{AF507438-7753-43e0-B8FC-AC1667EBCBE1}">
-              <a14:hiddenEffects xmlns="" xmlns:a14="http://schemas.microsoft.com/office/drawing/2010/main">
+              <a14:hiddenEffects xmlns:a14="http://schemas.microsoft.com/office/drawing/2010/main" xmlns="">
                 <a:effectLst>
                   <a:outerShdw blurRad="63500" dist="38099" dir="2700000" algn="ctr" rotWithShape="0">
                     <a:schemeClr val="bg2">
@@ -8678,17 +8678,17 @@
           <a:effectLst/>
           <a:extLst>
             <a:ext uri="{FAA26D3D-D897-4be2-8F04-BA451C77F1D7}">
-              <ma14:placeholderFlag xmlns:ma14="http://schemas.microsoft.com/office/mac/drawingml/2011/main" xmlns="" val="1"/>
+              <ma14:placeholderFlag xmlns="" xmlns:ma14="http://schemas.microsoft.com/office/mac/drawingml/2011/main" val="1"/>
             </a:ext>
             <a:ext uri="{909E8E84-426E-40dd-AFC4-6F175D3DCCD1}">
-              <a14:hiddenFill xmlns="" xmlns:a14="http://schemas.microsoft.com/office/drawing/2010/main">
+              <a14:hiddenFill xmlns:a14="http://schemas.microsoft.com/office/drawing/2010/main" xmlns="">
                 <a:solidFill>
                   <a:schemeClr val="accent1"/>
                 </a:solidFill>
               </a14:hiddenFill>
             </a:ext>
             <a:ext uri="{91240B29-F687-4f45-9708-019B960494DF}">
-              <a14:hiddenLine xmlns="" xmlns:a14="http://schemas.microsoft.com/office/drawing/2010/main" w="9525">
+              <a14:hiddenLine xmlns:a14="http://schemas.microsoft.com/office/drawing/2010/main" xmlns="" w="9525">
                 <a:solidFill>
                   <a:schemeClr val="tx1"/>
                 </a:solidFill>
@@ -8698,7 +8698,7 @@
               </a14:hiddenLine>
             </a:ext>
             <a:ext uri="{AF507438-7753-43e0-B8FC-AC1667EBCBE1}">
-              <a14:hiddenEffects xmlns="" xmlns:a14="http://schemas.microsoft.com/office/drawing/2010/main">
+              <a14:hiddenEffects xmlns:a14="http://schemas.microsoft.com/office/drawing/2010/main" xmlns="">
                 <a:effectLst>
                   <a:outerShdw blurRad="63500" dist="38099" dir="2700000" algn="ctr" rotWithShape="0">
                     <a:schemeClr val="bg2">
@@ -9355,7 +9355,7 @@
           <a:noFill/>
           <a:extLst>
             <a:ext uri="{909E8E84-426E-40dd-AFC4-6F175D3DCCD1}">
-              <a14:hiddenFill xmlns="" xmlns:a14="http://schemas.microsoft.com/office/drawing/2010/main">
+              <a14:hiddenFill xmlns:a14="http://schemas.microsoft.com/office/drawing/2010/main" xmlns="">
                 <a:solidFill>
                   <a:srgbClr val="FFFFFF"/>
                 </a:solidFill>
@@ -10152,14 +10152,14 @@
           </a:ln>
           <a:extLst>
             <a:ext uri="{909E8E84-426E-40dd-AFC4-6F175D3DCCD1}">
-              <a14:hiddenFill xmlns="" xmlns:a14="http://schemas.microsoft.com/office/drawing/2010/main">
+              <a14:hiddenFill xmlns:a14="http://schemas.microsoft.com/office/drawing/2010/main" xmlns="">
                 <a:solidFill>
                   <a:srgbClr val="FFFFFF"/>
                 </a:solidFill>
               </a14:hiddenFill>
             </a:ext>
             <a:ext uri="{91240B29-F687-4f45-9708-019B960494DF}">
-              <a14:hiddenLine xmlns="" xmlns:a14="http://schemas.microsoft.com/office/drawing/2010/main" w="9525">
+              <a14:hiddenLine xmlns:a14="http://schemas.microsoft.com/office/drawing/2010/main" xmlns="" w="9525">
                 <a:solidFill>
                   <a:srgbClr val="000000"/>
                 </a:solidFill>
@@ -10459,14 +10459,14 @@
             <a:effectLst/>
             <a:extLst>
               <a:ext uri="{909E8E84-426E-40dd-AFC4-6F175D3DCCD1}">
-                <a14:hiddenFill xmlns="" xmlns:a14="http://schemas.microsoft.com/office/drawing/2010/main">
+                <a14:hiddenFill xmlns:a14="http://schemas.microsoft.com/office/drawing/2010/main" xmlns="">
                   <a:solidFill>
                     <a:schemeClr val="accent1"/>
                   </a:solidFill>
                 </a14:hiddenFill>
               </a:ext>
               <a:ext uri="{AF507438-7753-43e0-B8FC-AC1667EBCBE1}">
-                <a14:hiddenEffects xmlns="" xmlns:a14="http://schemas.microsoft.com/office/drawing/2010/main">
+                <a14:hiddenEffects xmlns:a14="http://schemas.microsoft.com/office/drawing/2010/main" xmlns="">
                   <a:effectLst>
                     <a:outerShdw dist="35921" dir="2700000" algn="ctr" rotWithShape="0">
                       <a:schemeClr val="bg2"/>
@@ -10512,12 +10512,12 @@
             <a:effectLst/>
             <a:extLst>
               <a:ext uri="{909E8E84-426E-40dd-AFC4-6F175D3DCCD1}">
-                <a14:hiddenFill xmlns="" xmlns:a14="http://schemas.microsoft.com/office/drawing/2010/main">
+                <a14:hiddenFill xmlns:a14="http://schemas.microsoft.com/office/drawing/2010/main" xmlns="">
                   <a:noFill/>
                 </a14:hiddenFill>
               </a:ext>
               <a:ext uri="{AF507438-7753-43e0-B8FC-AC1667EBCBE1}">
-                <a14:hiddenEffects xmlns="" xmlns:a14="http://schemas.microsoft.com/office/drawing/2010/main">
+                <a14:hiddenEffects xmlns:a14="http://schemas.microsoft.com/office/drawing/2010/main" xmlns="">
                   <a:effectLst>
                     <a:outerShdw blurRad="63500" dist="38099" dir="2700000" algn="ctr" rotWithShape="0">
                       <a:schemeClr val="bg2">
@@ -10570,12 +10570,12 @@
             <a:effectLst/>
             <a:extLst>
               <a:ext uri="{909E8E84-426E-40dd-AFC4-6F175D3DCCD1}">
-                <a14:hiddenFill xmlns="" xmlns:a14="http://schemas.microsoft.com/office/drawing/2010/main">
+                <a14:hiddenFill xmlns:a14="http://schemas.microsoft.com/office/drawing/2010/main" xmlns="">
                   <a:noFill/>
                 </a14:hiddenFill>
               </a:ext>
               <a:ext uri="{AF507438-7753-43e0-B8FC-AC1667EBCBE1}">
-                <a14:hiddenEffects xmlns="" xmlns:a14="http://schemas.microsoft.com/office/drawing/2010/main">
+                <a14:hiddenEffects xmlns:a14="http://schemas.microsoft.com/office/drawing/2010/main" xmlns="">
                   <a:effectLst>
                     <a:outerShdw blurRad="63500" dist="38099" dir="2700000" algn="ctr" rotWithShape="0">
                       <a:schemeClr val="bg2">
@@ -10628,12 +10628,12 @@
             <a:effectLst/>
             <a:extLst>
               <a:ext uri="{909E8E84-426E-40dd-AFC4-6F175D3DCCD1}">
-                <a14:hiddenFill xmlns="" xmlns:a14="http://schemas.microsoft.com/office/drawing/2010/main">
+                <a14:hiddenFill xmlns:a14="http://schemas.microsoft.com/office/drawing/2010/main" xmlns="">
                   <a:noFill/>
                 </a14:hiddenFill>
               </a:ext>
               <a:ext uri="{AF507438-7753-43e0-B8FC-AC1667EBCBE1}">
-                <a14:hiddenEffects xmlns="" xmlns:a14="http://schemas.microsoft.com/office/drawing/2010/main">
+                <a14:hiddenEffects xmlns:a14="http://schemas.microsoft.com/office/drawing/2010/main" xmlns="">
                   <a:effectLst>
                     <a:outerShdw blurRad="63500" dist="38099" dir="2700000" algn="ctr" rotWithShape="0">
                       <a:schemeClr val="bg2">
@@ -10686,12 +10686,12 @@
             <a:effectLst/>
             <a:extLst>
               <a:ext uri="{909E8E84-426E-40dd-AFC4-6F175D3DCCD1}">
-                <a14:hiddenFill xmlns="" xmlns:a14="http://schemas.microsoft.com/office/drawing/2010/main">
+                <a14:hiddenFill xmlns:a14="http://schemas.microsoft.com/office/drawing/2010/main" xmlns="">
                   <a:noFill/>
                 </a14:hiddenFill>
               </a:ext>
               <a:ext uri="{AF507438-7753-43e0-B8FC-AC1667EBCBE1}">
-                <a14:hiddenEffects xmlns="" xmlns:a14="http://schemas.microsoft.com/office/drawing/2010/main">
+                <a14:hiddenEffects xmlns:a14="http://schemas.microsoft.com/office/drawing/2010/main" xmlns="">
                   <a:effectLst>
                     <a:outerShdw blurRad="63500" dist="38099" dir="2700000" algn="ctr" rotWithShape="0">
                       <a:schemeClr val="bg2">
@@ -10739,14 +10739,14 @@
             <a:effectLst/>
             <a:extLst>
               <a:ext uri="{909E8E84-426E-40dd-AFC4-6F175D3DCCD1}">
-                <a14:hiddenFill xmlns="" xmlns:a14="http://schemas.microsoft.com/office/drawing/2010/main">
+                <a14:hiddenFill xmlns:a14="http://schemas.microsoft.com/office/drawing/2010/main" xmlns="">
                   <a:solidFill>
                     <a:schemeClr val="accent1"/>
                   </a:solidFill>
                 </a14:hiddenFill>
               </a:ext>
               <a:ext uri="{91240B29-F687-4f45-9708-019B960494DF}">
-                <a14:hiddenLine xmlns="" xmlns:a14="http://schemas.microsoft.com/office/drawing/2010/main" w="9525">
+                <a14:hiddenLine xmlns:a14="http://schemas.microsoft.com/office/drawing/2010/main" xmlns="" w="9525">
                   <a:solidFill>
                     <a:schemeClr val="tx1"/>
                   </a:solidFill>
@@ -10756,7 +10756,7 @@
                 </a14:hiddenLine>
               </a:ext>
               <a:ext uri="{AF507438-7753-43e0-B8FC-AC1667EBCBE1}">
-                <a14:hiddenEffects xmlns="" xmlns:a14="http://schemas.microsoft.com/office/drawing/2010/main">
+                <a14:hiddenEffects xmlns:a14="http://schemas.microsoft.com/office/drawing/2010/main" xmlns="">
                   <a:effectLst>
                     <a:outerShdw blurRad="63500" dist="38099" dir="2700000" algn="ctr" rotWithShape="0">
                       <a:schemeClr val="bg2">
@@ -10915,14 +10915,14 @@
             <a:effectLst/>
             <a:extLst>
               <a:ext uri="{909E8E84-426E-40dd-AFC4-6F175D3DCCD1}">
-                <a14:hiddenFill xmlns="" xmlns:a14="http://schemas.microsoft.com/office/drawing/2010/main">
+                <a14:hiddenFill xmlns:a14="http://schemas.microsoft.com/office/drawing/2010/main" xmlns="">
                   <a:solidFill>
                     <a:schemeClr val="accent1"/>
                   </a:solidFill>
                 </a14:hiddenFill>
               </a:ext>
               <a:ext uri="{91240B29-F687-4f45-9708-019B960494DF}">
-                <a14:hiddenLine xmlns="" xmlns:a14="http://schemas.microsoft.com/office/drawing/2010/main" w="9525">
+                <a14:hiddenLine xmlns:a14="http://schemas.microsoft.com/office/drawing/2010/main" xmlns="" w="9525">
                   <a:solidFill>
                     <a:schemeClr val="tx1"/>
                   </a:solidFill>
@@ -10932,7 +10932,7 @@
                 </a14:hiddenLine>
               </a:ext>
               <a:ext uri="{AF507438-7753-43e0-B8FC-AC1667EBCBE1}">
-                <a14:hiddenEffects xmlns="" xmlns:a14="http://schemas.microsoft.com/office/drawing/2010/main">
+                <a14:hiddenEffects xmlns:a14="http://schemas.microsoft.com/office/drawing/2010/main" xmlns="">
                   <a:effectLst>
                     <a:outerShdw blurRad="63500" dist="38099" dir="2700000" algn="ctr" rotWithShape="0">
                       <a:schemeClr val="bg2">
@@ -11108,14 +11108,14 @@
             <a:effectLst/>
             <a:extLst>
               <a:ext uri="{909E8E84-426E-40dd-AFC4-6F175D3DCCD1}">
-                <a14:hiddenFill xmlns="" xmlns:a14="http://schemas.microsoft.com/office/drawing/2010/main">
+                <a14:hiddenFill xmlns:a14="http://schemas.microsoft.com/office/drawing/2010/main" xmlns="">
                   <a:solidFill>
                     <a:schemeClr val="accent1"/>
                   </a:solidFill>
                 </a14:hiddenFill>
               </a:ext>
               <a:ext uri="{91240B29-F687-4f45-9708-019B960494DF}">
-                <a14:hiddenLine xmlns="" xmlns:a14="http://schemas.microsoft.com/office/drawing/2010/main" w="9525">
+                <a14:hiddenLine xmlns:a14="http://schemas.microsoft.com/office/drawing/2010/main" xmlns="" w="9525">
                   <a:solidFill>
                     <a:schemeClr val="tx1"/>
                   </a:solidFill>
@@ -11125,7 +11125,7 @@
                 </a14:hiddenLine>
               </a:ext>
               <a:ext uri="{AF507438-7753-43e0-B8FC-AC1667EBCBE1}">
-                <a14:hiddenEffects xmlns="" xmlns:a14="http://schemas.microsoft.com/office/drawing/2010/main">
+                <a14:hiddenEffects xmlns:a14="http://schemas.microsoft.com/office/drawing/2010/main" xmlns="">
                   <a:effectLst>
                     <a:outerShdw blurRad="63500" dist="38099" dir="2700000" algn="ctr" rotWithShape="0">
                       <a:schemeClr val="bg2">
@@ -11300,14 +11300,14 @@
               <a:effectLst/>
               <a:extLst>
                 <a:ext uri="{909E8E84-426E-40dd-AFC4-6F175D3DCCD1}">
-                  <a14:hiddenFill xmlns="" xmlns:a14="http://schemas.microsoft.com/office/drawing/2010/main">
+                  <a14:hiddenFill xmlns:a14="http://schemas.microsoft.com/office/drawing/2010/main" xmlns="">
                     <a:solidFill>
                       <a:schemeClr val="accent1"/>
                     </a:solidFill>
                   </a14:hiddenFill>
                 </a:ext>
                 <a:ext uri="{91240B29-F687-4f45-9708-019B960494DF}">
-                  <a14:hiddenLine xmlns="" xmlns:a14="http://schemas.microsoft.com/office/drawing/2010/main" w="9525">
+                  <a14:hiddenLine xmlns:a14="http://schemas.microsoft.com/office/drawing/2010/main" xmlns="" w="9525">
                     <a:solidFill>
                       <a:schemeClr val="tx1"/>
                     </a:solidFill>
@@ -11317,7 +11317,7 @@
                   </a14:hiddenLine>
                 </a:ext>
                 <a:ext uri="{AF507438-7753-43e0-B8FC-AC1667EBCBE1}">
-                  <a14:hiddenEffects xmlns="" xmlns:a14="http://schemas.microsoft.com/office/drawing/2010/main">
+                  <a14:hiddenEffects xmlns:a14="http://schemas.microsoft.com/office/drawing/2010/main" xmlns="">
                     <a:effectLst>
                       <a:outerShdw blurRad="63500" dist="38099" dir="2700000" algn="ctr" rotWithShape="0">
                         <a:schemeClr val="bg2">
@@ -11476,14 +11476,14 @@
               <a:effectLst/>
               <a:extLst>
                 <a:ext uri="{909E8E84-426E-40dd-AFC4-6F175D3DCCD1}">
-                  <a14:hiddenFill xmlns="" xmlns:a14="http://schemas.microsoft.com/office/drawing/2010/main">
+                  <a14:hiddenFill xmlns:a14="http://schemas.microsoft.com/office/drawing/2010/main" xmlns="">
                     <a:solidFill>
                       <a:schemeClr val="accent1"/>
                     </a:solidFill>
                   </a14:hiddenFill>
                 </a:ext>
                 <a:ext uri="{91240B29-F687-4f45-9708-019B960494DF}">
-                  <a14:hiddenLine xmlns="" xmlns:a14="http://schemas.microsoft.com/office/drawing/2010/main" w="9525">
+                  <a14:hiddenLine xmlns:a14="http://schemas.microsoft.com/office/drawing/2010/main" xmlns="" w="9525">
                     <a:solidFill>
                       <a:schemeClr val="tx1"/>
                     </a:solidFill>
@@ -11493,7 +11493,7 @@
                   </a14:hiddenLine>
                 </a:ext>
                 <a:ext uri="{AF507438-7753-43e0-B8FC-AC1667EBCBE1}">
-                  <a14:hiddenEffects xmlns="" xmlns:a14="http://schemas.microsoft.com/office/drawing/2010/main">
+                  <a14:hiddenEffects xmlns:a14="http://schemas.microsoft.com/office/drawing/2010/main" xmlns="">
                     <a:effectLst>
                       <a:outerShdw blurRad="63500" dist="38099" dir="2700000" algn="ctr" rotWithShape="0">
                         <a:schemeClr val="bg2">
@@ -11657,12 +11657,12 @@
               <a:effectLst/>
               <a:extLst>
                 <a:ext uri="{909E8E84-426E-40dd-AFC4-6F175D3DCCD1}">
-                  <a14:hiddenFill xmlns="" xmlns:a14="http://schemas.microsoft.com/office/drawing/2010/main">
+                  <a14:hiddenFill xmlns:a14="http://schemas.microsoft.com/office/drawing/2010/main" xmlns="">
                     <a:noFill/>
                   </a14:hiddenFill>
                 </a:ext>
                 <a:ext uri="{AF507438-7753-43e0-B8FC-AC1667EBCBE1}">
-                  <a14:hiddenEffects xmlns="" xmlns:a14="http://schemas.microsoft.com/office/drawing/2010/main">
+                  <a14:hiddenEffects xmlns:a14="http://schemas.microsoft.com/office/drawing/2010/main" xmlns="">
                     <a:effectLst>
                       <a:outerShdw blurRad="63500" dist="38099" dir="2700000" algn="ctr" rotWithShape="0">
                         <a:schemeClr val="bg2">
@@ -11710,14 +11710,14 @@
               <a:effectLst/>
               <a:extLst>
                 <a:ext uri="{909E8E84-426E-40dd-AFC4-6F175D3DCCD1}">
-                  <a14:hiddenFill xmlns="" xmlns:a14="http://schemas.microsoft.com/office/drawing/2010/main">
+                  <a14:hiddenFill xmlns:a14="http://schemas.microsoft.com/office/drawing/2010/main" xmlns="">
                     <a:solidFill>
                       <a:schemeClr val="accent1"/>
                     </a:solidFill>
                   </a14:hiddenFill>
                 </a:ext>
                 <a:ext uri="{91240B29-F687-4f45-9708-019B960494DF}">
-                  <a14:hiddenLine xmlns="" xmlns:a14="http://schemas.microsoft.com/office/drawing/2010/main" w="9525">
+                  <a14:hiddenLine xmlns:a14="http://schemas.microsoft.com/office/drawing/2010/main" xmlns="" w="9525">
                     <a:solidFill>
                       <a:schemeClr val="tx1"/>
                     </a:solidFill>
@@ -11727,7 +11727,7 @@
                   </a14:hiddenLine>
                 </a:ext>
                 <a:ext uri="{AF507438-7753-43e0-B8FC-AC1667EBCBE1}">
-                  <a14:hiddenEffects xmlns="" xmlns:a14="http://schemas.microsoft.com/office/drawing/2010/main">
+                  <a14:hiddenEffects xmlns:a14="http://schemas.microsoft.com/office/drawing/2010/main" xmlns="">
                     <a:effectLst>
                       <a:outerShdw blurRad="63500" dist="38099" dir="2700000" algn="ctr" rotWithShape="0">
                         <a:schemeClr val="bg2">
@@ -11886,14 +11886,14 @@
               <a:effectLst/>
               <a:extLst>
                 <a:ext uri="{909E8E84-426E-40dd-AFC4-6F175D3DCCD1}">
-                  <a14:hiddenFill xmlns="" xmlns:a14="http://schemas.microsoft.com/office/drawing/2010/main">
+                  <a14:hiddenFill xmlns:a14="http://schemas.microsoft.com/office/drawing/2010/main" xmlns="">
                     <a:solidFill>
                       <a:schemeClr val="accent1"/>
                     </a:solidFill>
                   </a14:hiddenFill>
                 </a:ext>
                 <a:ext uri="{91240B29-F687-4f45-9708-019B960494DF}">
-                  <a14:hiddenLine xmlns="" xmlns:a14="http://schemas.microsoft.com/office/drawing/2010/main" w="9525">
+                  <a14:hiddenLine xmlns:a14="http://schemas.microsoft.com/office/drawing/2010/main" xmlns="" w="9525">
                     <a:solidFill>
                       <a:schemeClr val="tx1"/>
                     </a:solidFill>
@@ -11903,7 +11903,7 @@
                   </a14:hiddenLine>
                 </a:ext>
                 <a:ext uri="{AF507438-7753-43e0-B8FC-AC1667EBCBE1}">
-                  <a14:hiddenEffects xmlns="" xmlns:a14="http://schemas.microsoft.com/office/drawing/2010/main">
+                  <a14:hiddenEffects xmlns:a14="http://schemas.microsoft.com/office/drawing/2010/main" xmlns="">
                     <a:effectLst>
                       <a:outerShdw blurRad="63500" dist="38099" dir="2700000" algn="ctr" rotWithShape="0">
                         <a:schemeClr val="bg2">
@@ -12067,12 +12067,12 @@
               <a:effectLst/>
               <a:extLst>
                 <a:ext uri="{909E8E84-426E-40dd-AFC4-6F175D3DCCD1}">
-                  <a14:hiddenFill xmlns="" xmlns:a14="http://schemas.microsoft.com/office/drawing/2010/main">
+                  <a14:hiddenFill xmlns:a14="http://schemas.microsoft.com/office/drawing/2010/main" xmlns="">
                     <a:noFill/>
                   </a14:hiddenFill>
                 </a:ext>
                 <a:ext uri="{AF507438-7753-43e0-B8FC-AC1667EBCBE1}">
-                  <a14:hiddenEffects xmlns="" xmlns:a14="http://schemas.microsoft.com/office/drawing/2010/main">
+                  <a14:hiddenEffects xmlns:a14="http://schemas.microsoft.com/office/drawing/2010/main" xmlns="">
                     <a:effectLst>
                       <a:outerShdw blurRad="63500" dist="38099" dir="2700000" algn="ctr" rotWithShape="0">
                         <a:schemeClr val="bg2">
@@ -12120,14 +12120,14 @@
               <a:effectLst/>
               <a:extLst>
                 <a:ext uri="{909E8E84-426E-40dd-AFC4-6F175D3DCCD1}">
-                  <a14:hiddenFill xmlns="" xmlns:a14="http://schemas.microsoft.com/office/drawing/2010/main">
+                  <a14:hiddenFill xmlns:a14="http://schemas.microsoft.com/office/drawing/2010/main" xmlns="">
                     <a:solidFill>
                       <a:schemeClr val="accent1"/>
                     </a:solidFill>
                   </a14:hiddenFill>
                 </a:ext>
                 <a:ext uri="{91240B29-F687-4f45-9708-019B960494DF}">
-                  <a14:hiddenLine xmlns="" xmlns:a14="http://schemas.microsoft.com/office/drawing/2010/main" w="9525">
+                  <a14:hiddenLine xmlns:a14="http://schemas.microsoft.com/office/drawing/2010/main" xmlns="" w="9525">
                     <a:solidFill>
                       <a:schemeClr val="tx1"/>
                     </a:solidFill>
@@ -12137,7 +12137,7 @@
                   </a14:hiddenLine>
                 </a:ext>
                 <a:ext uri="{AF507438-7753-43e0-B8FC-AC1667EBCBE1}">
-                  <a14:hiddenEffects xmlns="" xmlns:a14="http://schemas.microsoft.com/office/drawing/2010/main">
+                  <a14:hiddenEffects xmlns:a14="http://schemas.microsoft.com/office/drawing/2010/main" xmlns="">
                     <a:effectLst>
                       <a:outerShdw blurRad="63500" dist="38099" dir="2700000" algn="ctr" rotWithShape="0">
                         <a:schemeClr val="bg2">
@@ -12431,14 +12431,14 @@
           </a:ln>
           <a:extLst>
             <a:ext uri="{909E8E84-426E-40dd-AFC4-6F175D3DCCD1}">
-              <a14:hiddenFill xmlns="" xmlns:a14="http://schemas.microsoft.com/office/drawing/2010/main">
+              <a14:hiddenFill xmlns:a14="http://schemas.microsoft.com/office/drawing/2010/main" xmlns="">
                 <a:solidFill>
                   <a:srgbClr val="FFFFFF"/>
                 </a:solidFill>
               </a14:hiddenFill>
             </a:ext>
             <a:ext uri="{91240B29-F687-4f45-9708-019B960494DF}">
-              <a14:hiddenLine xmlns="" xmlns:a14="http://schemas.microsoft.com/office/drawing/2010/main" w="9525">
+              <a14:hiddenLine xmlns:a14="http://schemas.microsoft.com/office/drawing/2010/main" xmlns="" w="9525">
                 <a:solidFill>
                   <a:srgbClr val="000000"/>
                 </a:solidFill>
@@ -12527,7 +12527,7 @@
               <a:defRPr/>
             </a:pPr>
             <a:r>
-              <a:rPr lang="en-US" sz="2800">
+              <a:rPr lang="en-US" sz="2800" dirty="0">
                 <a:latin typeface="Gill Sans MT" charset="0"/>
                 <a:cs typeface="+mn-cs"/>
               </a:rPr>
@@ -12539,7 +12539,7 @@
               <a:defRPr/>
             </a:pPr>
             <a:r>
-              <a:rPr lang="en-US" sz="2800">
+              <a:rPr lang="en-US" sz="2800" dirty="0">
                 <a:latin typeface="Gill Sans MT" charset="0"/>
                 <a:cs typeface="+mn-cs"/>
               </a:rPr>
@@ -12551,38 +12551,38 @@
               <a:defRPr/>
             </a:pPr>
             <a:r>
-              <a:rPr lang="en-US" sz="2800">
+              <a:rPr lang="en-US" sz="2800" dirty="0">
                 <a:latin typeface="Gill Sans MT" charset="0"/>
                 <a:cs typeface="+mn-cs"/>
               </a:rPr>
               <a:t>throughput in terms of segment loss probability, L </a:t>
             </a:r>
             <a:r>
-              <a:rPr lang="en-US" sz="2000">
+              <a:rPr lang="en-US" sz="2000" dirty="0">
                 <a:latin typeface="Gill Sans MT" charset="0"/>
                 <a:cs typeface="+mn-cs"/>
               </a:rPr>
               <a:t>[Mathis 1997]:</a:t>
             </a:r>
             <a:br>
-              <a:rPr lang="en-US" sz="2800">
+              <a:rPr lang="en-US" sz="2800" dirty="0">
                 <a:latin typeface="Gill Sans MT" charset="0"/>
                 <a:cs typeface="+mn-cs"/>
               </a:rPr>
             </a:br>
             <a:br>
-              <a:rPr lang="en-US" sz="2800">
+              <a:rPr lang="en-US" sz="2800" dirty="0">
                 <a:latin typeface="Gill Sans MT" charset="0"/>
                 <a:cs typeface="+mn-cs"/>
               </a:rPr>
             </a:br>
             <a:br>
-              <a:rPr lang="en-US" sz="2800">
+              <a:rPr lang="en-US" sz="2800" dirty="0">
                 <a:latin typeface="Gill Sans MT" charset="0"/>
                 <a:cs typeface="+mn-cs"/>
               </a:rPr>
             </a:br>
-            <a:endParaRPr lang="en-US" sz="2800">
+            <a:endParaRPr lang="en-US" sz="2800" dirty="0">
               <a:latin typeface="Gill Sans MT" charset="0"/>
               <a:cs typeface="+mn-cs"/>
             </a:endParaRPr>
@@ -12597,7 +12597,7 @@
               <a:defRPr/>
             </a:pPr>
             <a:r>
-              <a:rPr lang="en-US" sz="2400">
+              <a:rPr lang="en-US" sz="2400" dirty="0">
                 <a:latin typeface="MS Mincho" charset="0"/>
                 <a:ea typeface="MS Mincho" charset="0"/>
                 <a:cs typeface="MS Mincho" charset="0"/>
@@ -12605,7 +12605,7 @@
               <a:t>➜ </a:t>
             </a:r>
             <a:r>
-              <a:rPr lang="en-US" sz="2400">
+              <a:rPr lang="en-US" sz="2400" dirty="0">
                 <a:latin typeface="Gill Sans MT" charset="0"/>
                 <a:ea typeface="MS Mincho" charset="0"/>
                 <a:cs typeface="MS Mincho" charset="0"/>
@@ -12613,31 +12613,31 @@
               <a:t>to achieve 10 Gbps throughput, need a loss rate of </a:t>
             </a:r>
             <a:r>
-              <a:rPr lang="en-US" sz="2400">
+              <a:rPr lang="en-US" sz="2400" dirty="0">
                 <a:latin typeface="Gill Sans MT" charset="0"/>
               </a:rPr>
               <a:t>L = 2</a:t>
             </a:r>
             <a:r>
-              <a:rPr lang="el-GR" sz="2400">
+              <a:rPr lang="el-GR" sz="2400" dirty="0">
                 <a:latin typeface="Gill Sans MT" charset="0"/>
               </a:rPr>
               <a:t>·</a:t>
             </a:r>
             <a:r>
-              <a:rPr lang="en-US" sz="2400">
+              <a:rPr lang="en-US" sz="2400" dirty="0">
                 <a:latin typeface="Gill Sans MT" charset="0"/>
               </a:rPr>
               <a:t>10</a:t>
             </a:r>
             <a:r>
-              <a:rPr lang="en-US" sz="2400" baseline="30000">
+              <a:rPr lang="en-US" sz="2400" baseline="30000" dirty="0">
                 <a:latin typeface="Gill Sans MT" charset="0"/>
               </a:rPr>
               <a:t>-10  </a:t>
             </a:r>
             <a:r>
-              <a:rPr lang="en-US" sz="2400" i="1">
+              <a:rPr lang="en-US" sz="2400" i="1" dirty="0">
                 <a:solidFill>
                   <a:srgbClr val="FF0000"/>
                 </a:solidFill>
@@ -12651,13 +12651,13 @@
               <a:defRPr/>
             </a:pPr>
             <a:r>
-              <a:rPr lang="en-US" sz="2800">
+              <a:rPr lang="en-US" sz="2800" dirty="0">
                 <a:latin typeface="Gill Sans MT" charset="0"/>
                 <a:cs typeface="+mn-cs"/>
               </a:rPr>
               <a:t>new versions of TCP for high-speed</a:t>
             </a:r>
-            <a:endParaRPr lang="en-US" sz="2800" baseline="30000">
+            <a:endParaRPr lang="en-US" sz="2800" baseline="30000" dirty="0">
               <a:latin typeface="Gill Sans MT" charset="0"/>
               <a:cs typeface="+mn-cs"/>
             </a:endParaRPr>
@@ -12666,7 +12666,7 @@
             <a:pPr>
               <a:defRPr/>
             </a:pPr>
-            <a:endParaRPr lang="en-US" sz="2800">
+            <a:endParaRPr lang="en-US" sz="2800" dirty="0">
               <a:latin typeface="Gill Sans MT" charset="0"/>
               <a:cs typeface="+mn-cs"/>
             </a:endParaRPr>
@@ -12712,14 +12712,14 @@
             <a:effectLst/>
             <a:extLst>
               <a:ext uri="{909E8E84-426E-40dd-AFC4-6F175D3DCCD1}">
-                <a14:hiddenFill xmlns="" xmlns:a14="http://schemas.microsoft.com/office/drawing/2010/main">
+                <a14:hiddenFill xmlns:a14="http://schemas.microsoft.com/office/drawing/2010/main" xmlns="">
                   <a:solidFill>
                     <a:schemeClr val="accent1"/>
                   </a:solidFill>
                 </a14:hiddenFill>
               </a:ext>
               <a:ext uri="{91240B29-F687-4f45-9708-019B960494DF}">
-                <a14:hiddenLine xmlns="" xmlns:a14="http://schemas.microsoft.com/office/drawing/2010/main" w="9525">
+                <a14:hiddenLine xmlns:a14="http://schemas.microsoft.com/office/drawing/2010/main" xmlns="" w="9525">
                   <a:solidFill>
                     <a:schemeClr val="tx1"/>
                   </a:solidFill>
@@ -12729,7 +12729,7 @@
                 </a14:hiddenLine>
               </a:ext>
               <a:ext uri="{AF507438-7753-43e0-B8FC-AC1667EBCBE1}">
-                <a14:hiddenEffects xmlns="" xmlns:a14="http://schemas.microsoft.com/office/drawing/2010/main">
+                <a14:hiddenEffects xmlns:a14="http://schemas.microsoft.com/office/drawing/2010/main" xmlns="">
                   <a:effectLst>
                     <a:outerShdw blurRad="63500" dist="38099" dir="2700000" algn="ctr" rotWithShape="0">
                       <a:schemeClr val="bg2">
@@ -12889,14 +12889,14 @@
             <a:effectLst/>
             <a:extLst>
               <a:ext uri="{909E8E84-426E-40dd-AFC4-6F175D3DCCD1}">
-                <a14:hiddenFill xmlns="" xmlns:a14="http://schemas.microsoft.com/office/drawing/2010/main">
+                <a14:hiddenFill xmlns:a14="http://schemas.microsoft.com/office/drawing/2010/main" xmlns="">
                   <a:solidFill>
                     <a:schemeClr val="accent1"/>
                   </a:solidFill>
                 </a14:hiddenFill>
               </a:ext>
               <a:ext uri="{91240B29-F687-4f45-9708-019B960494DF}">
-                <a14:hiddenLine xmlns="" xmlns:a14="http://schemas.microsoft.com/office/drawing/2010/main" w="9525">
+                <a14:hiddenLine xmlns:a14="http://schemas.microsoft.com/office/drawing/2010/main" xmlns="" w="9525">
                   <a:solidFill>
                     <a:schemeClr val="tx1"/>
                   </a:solidFill>
@@ -12906,7 +12906,7 @@
                 </a14:hiddenLine>
               </a:ext>
               <a:ext uri="{AF507438-7753-43e0-B8FC-AC1667EBCBE1}">
-                <a14:hiddenEffects xmlns="" xmlns:a14="http://schemas.microsoft.com/office/drawing/2010/main">
+                <a14:hiddenEffects xmlns:a14="http://schemas.microsoft.com/office/drawing/2010/main" xmlns="">
                   <a:effectLst>
                     <a:outerShdw blurRad="63500" dist="38099" dir="2700000" algn="ctr" rotWithShape="0">
                       <a:schemeClr val="bg2">
@@ -13082,14 +13082,14 @@
               <a:effectLst/>
               <a:extLst>
                 <a:ext uri="{909E8E84-426E-40dd-AFC4-6F175D3DCCD1}">
-                  <a14:hiddenFill xmlns="" xmlns:a14="http://schemas.microsoft.com/office/drawing/2010/main">
+                  <a14:hiddenFill xmlns:a14="http://schemas.microsoft.com/office/drawing/2010/main" xmlns="">
                     <a:solidFill>
                       <a:schemeClr val="accent1"/>
                     </a:solidFill>
                   </a14:hiddenFill>
                 </a:ext>
                 <a:ext uri="{91240B29-F687-4f45-9708-019B960494DF}">
-                  <a14:hiddenLine xmlns="" xmlns:a14="http://schemas.microsoft.com/office/drawing/2010/main" w="9525">
+                  <a14:hiddenLine xmlns:a14="http://schemas.microsoft.com/office/drawing/2010/main" xmlns="" w="9525">
                     <a:solidFill>
                       <a:schemeClr val="tx1"/>
                     </a:solidFill>
@@ -13099,7 +13099,7 @@
                   </a14:hiddenLine>
                 </a:ext>
                 <a:ext uri="{AF507438-7753-43e0-B8FC-AC1667EBCBE1}">
-                  <a14:hiddenEffects xmlns="" xmlns:a14="http://schemas.microsoft.com/office/drawing/2010/main">
+                  <a14:hiddenEffects xmlns:a14="http://schemas.microsoft.com/office/drawing/2010/main" xmlns="">
                     <a:effectLst>
                       <a:outerShdw blurRad="63500" dist="38099" dir="2700000" algn="ctr" rotWithShape="0">
                         <a:schemeClr val="bg2">
@@ -13259,14 +13259,14 @@
               <a:effectLst/>
               <a:extLst>
                 <a:ext uri="{909E8E84-426E-40dd-AFC4-6F175D3DCCD1}">
-                  <a14:hiddenFill xmlns="" xmlns:a14="http://schemas.microsoft.com/office/drawing/2010/main">
+                  <a14:hiddenFill xmlns:a14="http://schemas.microsoft.com/office/drawing/2010/main" xmlns="">
                     <a:solidFill>
                       <a:schemeClr val="accent1"/>
                     </a:solidFill>
                   </a14:hiddenFill>
                 </a:ext>
                 <a:ext uri="{91240B29-F687-4f45-9708-019B960494DF}">
-                  <a14:hiddenLine xmlns="" xmlns:a14="http://schemas.microsoft.com/office/drawing/2010/main" w="9525">
+                  <a14:hiddenLine xmlns:a14="http://schemas.microsoft.com/office/drawing/2010/main" xmlns="" w="9525">
                     <a:solidFill>
                       <a:schemeClr val="tx1"/>
                     </a:solidFill>
@@ -13276,7 +13276,7 @@
                   </a14:hiddenLine>
                 </a:ext>
                 <a:ext uri="{AF507438-7753-43e0-B8FC-AC1667EBCBE1}">
-                  <a14:hiddenEffects xmlns="" xmlns:a14="http://schemas.microsoft.com/office/drawing/2010/main">
+                  <a14:hiddenEffects xmlns:a14="http://schemas.microsoft.com/office/drawing/2010/main" xmlns="">
                     <a:effectLst>
                       <a:outerShdw blurRad="63500" dist="38099" dir="2700000" algn="ctr" rotWithShape="0">
                         <a:schemeClr val="bg2">
@@ -13441,12 +13441,12 @@
               <a:effectLst/>
               <a:extLst>
                 <a:ext uri="{909E8E84-426E-40dd-AFC4-6F175D3DCCD1}">
-                  <a14:hiddenFill xmlns="" xmlns:a14="http://schemas.microsoft.com/office/drawing/2010/main">
+                  <a14:hiddenFill xmlns:a14="http://schemas.microsoft.com/office/drawing/2010/main" xmlns="">
                     <a:noFill/>
                   </a14:hiddenFill>
                 </a:ext>
                 <a:ext uri="{AF507438-7753-43e0-B8FC-AC1667EBCBE1}">
-                  <a14:hiddenEffects xmlns="" xmlns:a14="http://schemas.microsoft.com/office/drawing/2010/main">
+                  <a14:hiddenEffects xmlns:a14="http://schemas.microsoft.com/office/drawing/2010/main" xmlns="">
                     <a:effectLst>
                       <a:outerShdw blurRad="63500" dist="38099" dir="2700000" algn="ctr" rotWithShape="0">
                         <a:schemeClr val="bg2">
@@ -13494,14 +13494,14 @@
               <a:effectLst/>
               <a:extLst>
                 <a:ext uri="{909E8E84-426E-40dd-AFC4-6F175D3DCCD1}">
-                  <a14:hiddenFill xmlns="" xmlns:a14="http://schemas.microsoft.com/office/drawing/2010/main">
+                  <a14:hiddenFill xmlns:a14="http://schemas.microsoft.com/office/drawing/2010/main" xmlns="">
                     <a:solidFill>
                       <a:schemeClr val="accent1"/>
                     </a:solidFill>
                   </a14:hiddenFill>
                 </a:ext>
                 <a:ext uri="{91240B29-F687-4f45-9708-019B960494DF}">
-                  <a14:hiddenLine xmlns="" xmlns:a14="http://schemas.microsoft.com/office/drawing/2010/main" w="9525">
+                  <a14:hiddenLine xmlns:a14="http://schemas.microsoft.com/office/drawing/2010/main" xmlns="" w="9525">
                     <a:solidFill>
                       <a:schemeClr val="tx1"/>
                     </a:solidFill>
@@ -13511,7 +13511,7 @@
                   </a14:hiddenLine>
                 </a:ext>
                 <a:ext uri="{AF507438-7753-43e0-B8FC-AC1667EBCBE1}">
-                  <a14:hiddenEffects xmlns="" xmlns:a14="http://schemas.microsoft.com/office/drawing/2010/main">
+                  <a14:hiddenEffects xmlns:a14="http://schemas.microsoft.com/office/drawing/2010/main" xmlns="">
                     <a:effectLst>
                       <a:outerShdw blurRad="63500" dist="38099" dir="2700000" algn="ctr" rotWithShape="0">
                         <a:schemeClr val="bg2">
@@ -13732,14 +13732,14 @@
               <a:effectLst/>
               <a:extLst>
                 <a:ext uri="{909E8E84-426E-40dd-AFC4-6F175D3DCCD1}">
-                  <a14:hiddenFill xmlns="" xmlns:a14="http://schemas.microsoft.com/office/drawing/2010/main">
+                  <a14:hiddenFill xmlns:a14="http://schemas.microsoft.com/office/drawing/2010/main" xmlns="">
                     <a:solidFill>
                       <a:schemeClr val="accent1"/>
                     </a:solidFill>
                   </a14:hiddenFill>
                 </a:ext>
                 <a:ext uri="{AF507438-7753-43e0-B8FC-AC1667EBCBE1}">
-                  <a14:hiddenEffects xmlns="" xmlns:a14="http://schemas.microsoft.com/office/drawing/2010/main">
+                  <a14:hiddenEffects xmlns:a14="http://schemas.microsoft.com/office/drawing/2010/main" xmlns="">
                     <a:effectLst>
                       <a:outerShdw dist="35921" dir="2700000" algn="ctr" rotWithShape="0">
                         <a:schemeClr val="bg2"/>
@@ -13780,14 +13780,14 @@
               <a:effectLst/>
               <a:extLst>
                 <a:ext uri="{909E8E84-426E-40dd-AFC4-6F175D3DCCD1}">
-                  <a14:hiddenFill xmlns="" xmlns:a14="http://schemas.microsoft.com/office/drawing/2010/main">
+                  <a14:hiddenFill xmlns:a14="http://schemas.microsoft.com/office/drawing/2010/main" xmlns="">
                     <a:solidFill>
                       <a:schemeClr val="accent1"/>
                     </a:solidFill>
                   </a14:hiddenFill>
                 </a:ext>
                 <a:ext uri="{91240B29-F687-4f45-9708-019B960494DF}">
-                  <a14:hiddenLine xmlns="" xmlns:a14="http://schemas.microsoft.com/office/drawing/2010/main" w="9525">
+                  <a14:hiddenLine xmlns:a14="http://schemas.microsoft.com/office/drawing/2010/main" xmlns="" w="9525">
                     <a:solidFill>
                       <a:schemeClr val="tx1"/>
                     </a:solidFill>
@@ -13797,7 +13797,7 @@
                   </a14:hiddenLine>
                 </a:ext>
                 <a:ext uri="{AF507438-7753-43e0-B8FC-AC1667EBCBE1}">
-                  <a14:hiddenEffects xmlns="" xmlns:a14="http://schemas.microsoft.com/office/drawing/2010/main">
+                  <a14:hiddenEffects xmlns:a14="http://schemas.microsoft.com/office/drawing/2010/main" xmlns="">
                     <a:effectLst>
                       <a:outerShdw blurRad="63500" dist="38099" dir="2700000" algn="ctr" rotWithShape="0">
                         <a:schemeClr val="bg2">
@@ -14085,12 +14085,12 @@
           <a:effectLst/>
           <a:extLst>
             <a:ext uri="{909E8E84-426E-40dd-AFC4-6F175D3DCCD1}">
-              <a14:hiddenFill xmlns="" xmlns:a14="http://schemas.microsoft.com/office/drawing/2010/main">
+              <a14:hiddenFill xmlns:a14="http://schemas.microsoft.com/office/drawing/2010/main" xmlns="">
                 <a:noFill/>
               </a14:hiddenFill>
             </a:ext>
             <a:ext uri="{AF507438-7753-43e0-B8FC-AC1667EBCBE1}">
-              <a14:hiddenEffects xmlns="" xmlns:a14="http://schemas.microsoft.com/office/drawing/2010/main">
+              <a14:hiddenEffects xmlns:a14="http://schemas.microsoft.com/office/drawing/2010/main" xmlns="">
                 <a:effectLst>
                   <a:outerShdw blurRad="63500" dist="38099" dir="2700000" algn="ctr" rotWithShape="0">
                     <a:schemeClr val="bg2">
@@ -14211,7 +14211,7 @@
             </a:ln>
             <a:extLst>
               <a:ext uri="{91240B29-F687-4f45-9708-019B960494DF}">
-                <a14:hiddenLine xmlns="" xmlns:a14="http://schemas.microsoft.com/office/drawing/2010/main" w="12700">
+                <a14:hiddenLine xmlns:a14="http://schemas.microsoft.com/office/drawing/2010/main" xmlns="" w="12700">
                   <a:solidFill>
                     <a:srgbClr val="000000"/>
                   </a:solidFill>
@@ -14371,14 +14371,14 @@
               <a:effectLst/>
               <a:extLst>
                 <a:ext uri="{909E8E84-426E-40dd-AFC4-6F175D3DCCD1}">
-                  <a14:hiddenFill xmlns="" xmlns:a14="http://schemas.microsoft.com/office/drawing/2010/main">
+                  <a14:hiddenFill xmlns:a14="http://schemas.microsoft.com/office/drawing/2010/main" xmlns="">
                     <a:solidFill>
                       <a:schemeClr val="accent1"/>
                     </a:solidFill>
                   </a14:hiddenFill>
                 </a:ext>
                 <a:ext uri="{AF507438-7753-43e0-B8FC-AC1667EBCBE1}">
-                  <a14:hiddenEffects xmlns="" xmlns:a14="http://schemas.microsoft.com/office/drawing/2010/main">
+                  <a14:hiddenEffects xmlns:a14="http://schemas.microsoft.com/office/drawing/2010/main" xmlns="">
                     <a:effectLst>
                       <a:outerShdw dist="35921" dir="2700000" algn="ctr" rotWithShape="0">
                         <a:schemeClr val="bg2"/>
@@ -14470,14 +14470,14 @@
               <a:effectLst/>
               <a:extLst>
                 <a:ext uri="{909E8E84-426E-40dd-AFC4-6F175D3DCCD1}">
-                  <a14:hiddenFill xmlns="" xmlns:a14="http://schemas.microsoft.com/office/drawing/2010/main">
+                  <a14:hiddenFill xmlns:a14="http://schemas.microsoft.com/office/drawing/2010/main" xmlns="">
                     <a:solidFill>
                       <a:schemeClr val="accent1"/>
                     </a:solidFill>
                   </a14:hiddenFill>
                 </a:ext>
                 <a:ext uri="{AF507438-7753-43e0-B8FC-AC1667EBCBE1}">
-                  <a14:hiddenEffects xmlns="" xmlns:a14="http://schemas.microsoft.com/office/drawing/2010/main">
+                  <a14:hiddenEffects xmlns:a14="http://schemas.microsoft.com/office/drawing/2010/main" xmlns="">
                     <a:effectLst>
                       <a:outerShdw dist="35921" dir="2700000" algn="ctr" rotWithShape="0">
                         <a:schemeClr val="bg2"/>
@@ -14524,12 +14524,12 @@
             <a:effectLst/>
             <a:extLst>
               <a:ext uri="{909E8E84-426E-40dd-AFC4-6F175D3DCCD1}">
-                <a14:hiddenFill xmlns="" xmlns:a14="http://schemas.microsoft.com/office/drawing/2010/main">
+                <a14:hiddenFill xmlns:a14="http://schemas.microsoft.com/office/drawing/2010/main" xmlns="">
                   <a:noFill/>
                 </a14:hiddenFill>
               </a:ext>
               <a:ext uri="{AF507438-7753-43e0-B8FC-AC1667EBCBE1}">
-                <a14:hiddenEffects xmlns="" xmlns:a14="http://schemas.microsoft.com/office/drawing/2010/main">
+                <a14:hiddenEffects xmlns:a14="http://schemas.microsoft.com/office/drawing/2010/main" xmlns="">
                   <a:effectLst>
                     <a:outerShdw blurRad="63500" dist="38099" dir="2700000" algn="ctr" rotWithShape="0">
                       <a:schemeClr val="bg2">
@@ -14582,12 +14582,12 @@
             <a:effectLst/>
             <a:extLst>
               <a:ext uri="{909E8E84-426E-40dd-AFC4-6F175D3DCCD1}">
-                <a14:hiddenFill xmlns="" xmlns:a14="http://schemas.microsoft.com/office/drawing/2010/main">
+                <a14:hiddenFill xmlns:a14="http://schemas.microsoft.com/office/drawing/2010/main" xmlns="">
                   <a:noFill/>
                 </a14:hiddenFill>
               </a:ext>
               <a:ext uri="{AF507438-7753-43e0-B8FC-AC1667EBCBE1}">
-                <a14:hiddenEffects xmlns="" xmlns:a14="http://schemas.microsoft.com/office/drawing/2010/main">
+                <a14:hiddenEffects xmlns:a14="http://schemas.microsoft.com/office/drawing/2010/main" xmlns="">
                   <a:effectLst>
                     <a:outerShdw blurRad="63500" dist="38099" dir="2700000" algn="ctr" rotWithShape="0">
                       <a:schemeClr val="bg2">
@@ -14709,7 +14709,7 @@
             </a:ln>
             <a:extLst>
               <a:ext uri="{91240B29-F687-4f45-9708-019B960494DF}">
-                <a14:hiddenLine xmlns="" xmlns:a14="http://schemas.microsoft.com/office/drawing/2010/main" w="12700">
+                <a14:hiddenLine xmlns:a14="http://schemas.microsoft.com/office/drawing/2010/main" xmlns="" w="12700">
                   <a:solidFill>
                     <a:srgbClr val="000000"/>
                   </a:solidFill>
@@ -14869,14 +14869,14 @@
               <a:effectLst/>
               <a:extLst>
                 <a:ext uri="{909E8E84-426E-40dd-AFC4-6F175D3DCCD1}">
-                  <a14:hiddenFill xmlns="" xmlns:a14="http://schemas.microsoft.com/office/drawing/2010/main">
+                  <a14:hiddenFill xmlns:a14="http://schemas.microsoft.com/office/drawing/2010/main" xmlns="">
                     <a:solidFill>
                       <a:schemeClr val="accent1"/>
                     </a:solidFill>
                   </a14:hiddenFill>
                 </a:ext>
                 <a:ext uri="{AF507438-7753-43e0-B8FC-AC1667EBCBE1}">
-                  <a14:hiddenEffects xmlns="" xmlns:a14="http://schemas.microsoft.com/office/drawing/2010/main">
+                  <a14:hiddenEffects xmlns:a14="http://schemas.microsoft.com/office/drawing/2010/main" xmlns="">
                     <a:effectLst>
                       <a:outerShdw dist="35921" dir="2700000" algn="ctr" rotWithShape="0">
                         <a:schemeClr val="bg2"/>
@@ -14968,14 +14968,14 @@
               <a:effectLst/>
               <a:extLst>
                 <a:ext uri="{909E8E84-426E-40dd-AFC4-6F175D3DCCD1}">
-                  <a14:hiddenFill xmlns="" xmlns:a14="http://schemas.microsoft.com/office/drawing/2010/main">
+                  <a14:hiddenFill xmlns:a14="http://schemas.microsoft.com/office/drawing/2010/main" xmlns="">
                     <a:solidFill>
                       <a:schemeClr val="accent1"/>
                     </a:solidFill>
                   </a14:hiddenFill>
                 </a:ext>
                 <a:ext uri="{AF507438-7753-43e0-B8FC-AC1667EBCBE1}">
-                  <a14:hiddenEffects xmlns="" xmlns:a14="http://schemas.microsoft.com/office/drawing/2010/main">
+                  <a14:hiddenEffects xmlns:a14="http://schemas.microsoft.com/office/drawing/2010/main" xmlns="">
                     <a:effectLst>
                       <a:outerShdw dist="35921" dir="2700000" algn="ctr" rotWithShape="0">
                         <a:schemeClr val="bg2"/>
@@ -15022,12 +15022,12 @@
             <a:effectLst/>
             <a:extLst>
               <a:ext uri="{909E8E84-426E-40dd-AFC4-6F175D3DCCD1}">
-                <a14:hiddenFill xmlns="" xmlns:a14="http://schemas.microsoft.com/office/drawing/2010/main">
+                <a14:hiddenFill xmlns:a14="http://schemas.microsoft.com/office/drawing/2010/main" xmlns="">
                   <a:noFill/>
                 </a14:hiddenFill>
               </a:ext>
               <a:ext uri="{AF507438-7753-43e0-B8FC-AC1667EBCBE1}">
-                <a14:hiddenEffects xmlns="" xmlns:a14="http://schemas.microsoft.com/office/drawing/2010/main">
+                <a14:hiddenEffects xmlns:a14="http://schemas.microsoft.com/office/drawing/2010/main" xmlns="">
                   <a:effectLst>
                     <a:outerShdw blurRad="63500" dist="38099" dir="2700000" algn="ctr" rotWithShape="0">
                       <a:schemeClr val="bg2">
@@ -15080,12 +15080,12 @@
             <a:effectLst/>
             <a:extLst>
               <a:ext uri="{909E8E84-426E-40dd-AFC4-6F175D3DCCD1}">
-                <a14:hiddenFill xmlns="" xmlns:a14="http://schemas.microsoft.com/office/drawing/2010/main">
+                <a14:hiddenFill xmlns:a14="http://schemas.microsoft.com/office/drawing/2010/main" xmlns="">
                   <a:noFill/>
                 </a14:hiddenFill>
               </a:ext>
               <a:ext uri="{AF507438-7753-43e0-B8FC-AC1667EBCBE1}">
-                <a14:hiddenEffects xmlns="" xmlns:a14="http://schemas.microsoft.com/office/drawing/2010/main">
+                <a14:hiddenEffects xmlns:a14="http://schemas.microsoft.com/office/drawing/2010/main" xmlns="">
                   <a:effectLst>
                     <a:outerShdw blurRad="63500" dist="38099" dir="2700000" algn="ctr" rotWithShape="0">
                       <a:schemeClr val="bg2">
@@ -15186,7 +15186,7 @@
           <a:effectLst/>
           <a:extLst>
             <a:ext uri="{AF507438-7753-43e0-B8FC-AC1667EBCBE1}">
-              <a14:hiddenEffects xmlns="" xmlns:a14="http://schemas.microsoft.com/office/drawing/2010/main">
+              <a14:hiddenEffects xmlns:a14="http://schemas.microsoft.com/office/drawing/2010/main" xmlns="">
                 <a:effectLst>
                   <a:outerShdw blurRad="63500" dist="38099" dir="2700000" algn="ctr" rotWithShape="0">
                     <a:schemeClr val="bg2">
@@ -15241,7 +15241,7 @@
           <a:effectLst/>
           <a:extLst>
             <a:ext uri="{AF507438-7753-43e0-B8FC-AC1667EBCBE1}">
-              <a14:hiddenEffects xmlns="" xmlns:a14="http://schemas.microsoft.com/office/drawing/2010/main">
+              <a14:hiddenEffects xmlns:a14="http://schemas.microsoft.com/office/drawing/2010/main" xmlns="">
                 <a:effectLst>
                   <a:outerShdw blurRad="63500" dist="38099" dir="2700000" algn="ctr" rotWithShape="0">
                     <a:schemeClr val="bg2">
@@ -15296,7 +15296,7 @@
           <a:effectLst/>
           <a:extLst>
             <a:ext uri="{AF507438-7753-43e0-B8FC-AC1667EBCBE1}">
-              <a14:hiddenEffects xmlns="" xmlns:a14="http://schemas.microsoft.com/office/drawing/2010/main">
+              <a14:hiddenEffects xmlns:a14="http://schemas.microsoft.com/office/drawing/2010/main" xmlns="">
                 <a:effectLst>
                   <a:outerShdw blurRad="63500" dist="38099" dir="2700000" algn="ctr" rotWithShape="0">
                     <a:schemeClr val="bg2">
@@ -15344,14 +15344,14 @@
           <a:effectLst/>
           <a:extLst>
             <a:ext uri="{909E8E84-426E-40dd-AFC4-6F175D3DCCD1}">
-              <a14:hiddenFill xmlns="" xmlns:a14="http://schemas.microsoft.com/office/drawing/2010/main">
+              <a14:hiddenFill xmlns:a14="http://schemas.microsoft.com/office/drawing/2010/main" xmlns="">
                 <a:solidFill>
                   <a:schemeClr val="accent1"/>
                 </a:solidFill>
               </a14:hiddenFill>
             </a:ext>
             <a:ext uri="{91240B29-F687-4f45-9708-019B960494DF}">
-              <a14:hiddenLine xmlns="" xmlns:a14="http://schemas.microsoft.com/office/drawing/2010/main" w="9525">
+              <a14:hiddenLine xmlns:a14="http://schemas.microsoft.com/office/drawing/2010/main" xmlns="" w="9525">
                 <a:solidFill>
                   <a:schemeClr val="tx1"/>
                 </a:solidFill>
@@ -15361,7 +15361,7 @@
               </a14:hiddenLine>
             </a:ext>
             <a:ext uri="{AF507438-7753-43e0-B8FC-AC1667EBCBE1}">
-              <a14:hiddenEffects xmlns="" xmlns:a14="http://schemas.microsoft.com/office/drawing/2010/main">
+              <a14:hiddenEffects xmlns:a14="http://schemas.microsoft.com/office/drawing/2010/main" xmlns="">
                 <a:effectLst>
                   <a:outerShdw blurRad="63500" dist="38099" dir="2700000" algn="ctr" rotWithShape="0">
                     <a:schemeClr val="bg2">
@@ -15521,14 +15521,14 @@
           <a:effectLst/>
           <a:extLst>
             <a:ext uri="{909E8E84-426E-40dd-AFC4-6F175D3DCCD1}">
-              <a14:hiddenFill xmlns="" xmlns:a14="http://schemas.microsoft.com/office/drawing/2010/main">
+              <a14:hiddenFill xmlns:a14="http://schemas.microsoft.com/office/drawing/2010/main" xmlns="">
                 <a:solidFill>
                   <a:schemeClr val="accent1"/>
                 </a:solidFill>
               </a14:hiddenFill>
             </a:ext>
             <a:ext uri="{91240B29-F687-4f45-9708-019B960494DF}">
-              <a14:hiddenLine xmlns="" xmlns:a14="http://schemas.microsoft.com/office/drawing/2010/main" w="9525">
+              <a14:hiddenLine xmlns:a14="http://schemas.microsoft.com/office/drawing/2010/main" xmlns="" w="9525">
                 <a:solidFill>
                   <a:schemeClr val="tx1"/>
                 </a:solidFill>
@@ -15538,7 +15538,7 @@
               </a14:hiddenLine>
             </a:ext>
             <a:ext uri="{AF507438-7753-43e0-B8FC-AC1667EBCBE1}">
-              <a14:hiddenEffects xmlns="" xmlns:a14="http://schemas.microsoft.com/office/drawing/2010/main">
+              <a14:hiddenEffects xmlns:a14="http://schemas.microsoft.com/office/drawing/2010/main" xmlns="">
                 <a:effectLst>
                   <a:outerShdw blurRad="63500" dist="38099" dir="2700000" algn="ctr" rotWithShape="0">
                     <a:schemeClr val="bg2">
@@ -15769,14 +15769,14 @@
           <a:effectLst/>
           <a:extLst>
             <a:ext uri="{909E8E84-426E-40dd-AFC4-6F175D3DCCD1}">
-              <a14:hiddenFill xmlns="" xmlns:a14="http://schemas.microsoft.com/office/drawing/2010/main">
+              <a14:hiddenFill xmlns:a14="http://schemas.microsoft.com/office/drawing/2010/main" xmlns="">
                 <a:solidFill>
                   <a:srgbClr val="FFFFFF"/>
                 </a:solidFill>
               </a14:hiddenFill>
             </a:ext>
             <a:ext uri="{AF507438-7753-43e0-B8FC-AC1667EBCBE1}">
-              <a14:hiddenEffects xmlns="" xmlns:a14="http://schemas.microsoft.com/office/drawing/2010/main">
+              <a14:hiddenEffects xmlns:a14="http://schemas.microsoft.com/office/drawing/2010/main" xmlns="">
                 <a:effectLst>
                   <a:outerShdw dist="35921" dir="2700000" algn="ctr" rotWithShape="0">
                     <a:schemeClr val="bg2"/>
@@ -15824,7 +15824,7 @@
           <a:effectLst/>
           <a:extLst>
             <a:ext uri="{AF507438-7753-43e0-B8FC-AC1667EBCBE1}">
-              <a14:hiddenEffects xmlns="" xmlns:a14="http://schemas.microsoft.com/office/drawing/2010/main">
+              <a14:hiddenEffects xmlns:a14="http://schemas.microsoft.com/office/drawing/2010/main" xmlns="">
                 <a:effectLst>
                   <a:outerShdw blurRad="63500" dist="38099" dir="2700000" algn="ctr" rotWithShape="0">
                     <a:schemeClr val="bg2">
@@ -15919,14 +15919,14 @@
           <a:effectLst/>
           <a:extLst>
             <a:ext uri="{909E8E84-426E-40dd-AFC4-6F175D3DCCD1}">
-              <a14:hiddenFill xmlns="" xmlns:a14="http://schemas.microsoft.com/office/drawing/2010/main">
+              <a14:hiddenFill xmlns:a14="http://schemas.microsoft.com/office/drawing/2010/main" xmlns="">
                 <a:solidFill>
                   <a:srgbClr val="FFFFFF"/>
                 </a:solidFill>
               </a14:hiddenFill>
             </a:ext>
             <a:ext uri="{AF507438-7753-43e0-B8FC-AC1667EBCBE1}">
-              <a14:hiddenEffects xmlns="" xmlns:a14="http://schemas.microsoft.com/office/drawing/2010/main">
+              <a14:hiddenEffects xmlns:a14="http://schemas.microsoft.com/office/drawing/2010/main" xmlns="">
                 <a:effectLst>
                   <a:outerShdw dist="35921" dir="2700000" algn="ctr" rotWithShape="0">
                     <a:schemeClr val="bg2"/>
@@ -16012,14 +16012,14 @@
           </a:ln>
           <a:extLst>
             <a:ext uri="{909E8E84-426E-40dd-AFC4-6F175D3DCCD1}">
-              <a14:hiddenFill xmlns="" xmlns:a14="http://schemas.microsoft.com/office/drawing/2010/main">
+              <a14:hiddenFill xmlns:a14="http://schemas.microsoft.com/office/drawing/2010/main" xmlns="">
                 <a:solidFill>
                   <a:srgbClr val="FFFFFF"/>
                 </a:solidFill>
               </a14:hiddenFill>
             </a:ext>
             <a:ext uri="{91240B29-F687-4f45-9708-019B960494DF}">
-              <a14:hiddenLine xmlns="" xmlns:a14="http://schemas.microsoft.com/office/drawing/2010/main" w="9525">
+              <a14:hiddenLine xmlns:a14="http://schemas.microsoft.com/office/drawing/2010/main" xmlns="" w="9525">
                 <a:solidFill>
                   <a:srgbClr val="000000"/>
                 </a:solidFill>
@@ -16054,14 +16054,14 @@
           <a:effectLst/>
           <a:extLst>
             <a:ext uri="{909E8E84-426E-40dd-AFC4-6F175D3DCCD1}">
-              <a14:hiddenFill xmlns="" xmlns:a14="http://schemas.microsoft.com/office/drawing/2010/main">
+              <a14:hiddenFill xmlns:a14="http://schemas.microsoft.com/office/drawing/2010/main" xmlns="">
                 <a:solidFill>
                   <a:schemeClr val="accent1"/>
                 </a:solidFill>
               </a14:hiddenFill>
             </a:ext>
             <a:ext uri="{91240B29-F687-4f45-9708-019B960494DF}">
-              <a14:hiddenLine xmlns="" xmlns:a14="http://schemas.microsoft.com/office/drawing/2010/main" w="9525">
+              <a14:hiddenLine xmlns:a14="http://schemas.microsoft.com/office/drawing/2010/main" xmlns="" w="9525">
                 <a:solidFill>
                   <a:schemeClr val="tx1"/>
                 </a:solidFill>
@@ -16071,7 +16071,7 @@
               </a14:hiddenLine>
             </a:ext>
             <a:ext uri="{AF507438-7753-43e0-B8FC-AC1667EBCBE1}">
-              <a14:hiddenEffects xmlns="" xmlns:a14="http://schemas.microsoft.com/office/drawing/2010/main">
+              <a14:hiddenEffects xmlns:a14="http://schemas.microsoft.com/office/drawing/2010/main" xmlns="">
                 <a:effectLst>
                   <a:outerShdw blurRad="63500" dist="38099" dir="2700000" algn="ctr" rotWithShape="0">
                     <a:schemeClr val="bg2">
@@ -16259,14 +16259,14 @@
             </a:ln>
             <a:extLst>
               <a:ext uri="{909E8E84-426E-40dd-AFC4-6F175D3DCCD1}">
-                <a14:hiddenFill xmlns="" xmlns:a14="http://schemas.microsoft.com/office/drawing/2010/main">
+                <a14:hiddenFill xmlns:a14="http://schemas.microsoft.com/office/drawing/2010/main" xmlns="">
                   <a:solidFill>
                     <a:srgbClr val="FFFFFF"/>
                   </a:solidFill>
                 </a14:hiddenFill>
               </a:ext>
               <a:ext uri="{91240B29-F687-4f45-9708-019B960494DF}">
-                <a14:hiddenLine xmlns="" xmlns:a14="http://schemas.microsoft.com/office/drawing/2010/main" w="9525">
+                <a14:hiddenLine xmlns:a14="http://schemas.microsoft.com/office/drawing/2010/main" xmlns="" w="9525">
                   <a:solidFill>
                     <a:srgbClr val="000000"/>
                   </a:solidFill>
@@ -16367,7 +16367,7 @@
             <a:effectLst/>
             <a:extLst>
               <a:ext uri="{91240B29-F687-4f45-9708-019B960494DF}">
-                <a14:hiddenLine xmlns="" xmlns:a14="http://schemas.microsoft.com/office/drawing/2010/main" w="9525" cap="flat" cmpd="sng">
+                <a14:hiddenLine xmlns:a14="http://schemas.microsoft.com/office/drawing/2010/main" xmlns="" w="9525" cap="flat" cmpd="sng">
                   <a:solidFill>
                     <a:schemeClr val="tx1"/>
                   </a:solidFill>
@@ -16378,7 +16378,7 @@
                 </a14:hiddenLine>
               </a:ext>
               <a:ext uri="{AF507438-7753-43e0-B8FC-AC1667EBCBE1}">
-                <a14:hiddenEffects xmlns="" xmlns:a14="http://schemas.microsoft.com/office/drawing/2010/main">
+                <a14:hiddenEffects xmlns:a14="http://schemas.microsoft.com/office/drawing/2010/main" xmlns="">
                   <a:effectLst>
                     <a:outerShdw dist="35921" dir="2700000" algn="ctr" rotWithShape="0">
                       <a:schemeClr val="bg2"/>
@@ -16448,14 +16448,14 @@
             </a:ln>
             <a:extLst>
               <a:ext uri="{909E8E84-426E-40dd-AFC4-6F175D3DCCD1}">
-                <a14:hiddenFill xmlns="" xmlns:a14="http://schemas.microsoft.com/office/drawing/2010/main">
+                <a14:hiddenFill xmlns:a14="http://schemas.microsoft.com/office/drawing/2010/main" xmlns="">
                   <a:solidFill>
                     <a:srgbClr val="FFFFFF"/>
                   </a:solidFill>
                 </a14:hiddenFill>
               </a:ext>
               <a:ext uri="{91240B29-F687-4f45-9708-019B960494DF}">
-                <a14:hiddenLine xmlns="" xmlns:a14="http://schemas.microsoft.com/office/drawing/2010/main" w="9525">
+                <a14:hiddenLine xmlns:a14="http://schemas.microsoft.com/office/drawing/2010/main" xmlns="" w="9525">
                   <a:solidFill>
                     <a:srgbClr val="000000"/>
                   </a:solidFill>
@@ -16556,7 +16556,7 @@
             <a:effectLst/>
             <a:extLst>
               <a:ext uri="{91240B29-F687-4f45-9708-019B960494DF}">
-                <a14:hiddenLine xmlns="" xmlns:a14="http://schemas.microsoft.com/office/drawing/2010/main" w="9525" cap="flat" cmpd="sng">
+                <a14:hiddenLine xmlns:a14="http://schemas.microsoft.com/office/drawing/2010/main" xmlns="" w="9525" cap="flat" cmpd="sng">
                   <a:solidFill>
                     <a:schemeClr val="tx1"/>
                   </a:solidFill>
@@ -16567,7 +16567,7 @@
                 </a14:hiddenLine>
               </a:ext>
               <a:ext uri="{AF507438-7753-43e0-B8FC-AC1667EBCBE1}">
-                <a14:hiddenEffects xmlns="" xmlns:a14="http://schemas.microsoft.com/office/drawing/2010/main">
+                <a14:hiddenEffects xmlns:a14="http://schemas.microsoft.com/office/drawing/2010/main" xmlns="">
                   <a:effectLst>
                     <a:outerShdw dist="35921" dir="2700000" algn="ctr" rotWithShape="0">
                       <a:schemeClr val="bg2"/>
@@ -16742,14 +16742,14 @@
           </a:ln>
           <a:extLst>
             <a:ext uri="{909E8E84-426E-40dd-AFC4-6F175D3DCCD1}">
-              <a14:hiddenFill xmlns="" xmlns:a14="http://schemas.microsoft.com/office/drawing/2010/main">
+              <a14:hiddenFill xmlns:a14="http://schemas.microsoft.com/office/drawing/2010/main" xmlns="">
                 <a:solidFill>
                   <a:srgbClr val="FFFFFF"/>
                 </a:solidFill>
               </a14:hiddenFill>
             </a:ext>
             <a:ext uri="{91240B29-F687-4f45-9708-019B960494DF}">
-              <a14:hiddenLine xmlns="" xmlns:a14="http://schemas.microsoft.com/office/drawing/2010/main" w="9525">
+              <a14:hiddenLine xmlns:a14="http://schemas.microsoft.com/office/drawing/2010/main" xmlns="" w="9525">
                 <a:solidFill>
                   <a:srgbClr val="000000"/>
                 </a:solidFill>
@@ -16801,7 +16801,7 @@
         </p:nvSpPr>
         <p:spPr>
           <a:xfrm>
-            <a:off x="609600" y="1400175"/>
+            <a:off x="419100" y="1371600"/>
             <a:ext cx="8305800" cy="4648200"/>
           </a:xfrm>
         </p:spPr>
@@ -16815,7 +16815,7 @@
               <a:defRPr/>
             </a:pPr>
             <a:r>
-              <a:rPr lang="en-US">
+              <a:rPr lang="en-US" dirty="0">
                 <a:latin typeface="Gill Sans MT" charset="0"/>
                 <a:cs typeface="+mn-cs"/>
               </a:rPr>
@@ -16827,7 +16827,7 @@
               <a:defRPr/>
             </a:pPr>
             <a:r>
-              <a:rPr lang="en-US" sz="2400">
+              <a:rPr lang="en-US" sz="2400" dirty="0">
                 <a:latin typeface="Gill Sans MT" charset="0"/>
                 <a:cs typeface="+mn-cs"/>
               </a:rPr>
@@ -16839,7 +16839,7 @@
               <a:defRPr/>
             </a:pPr>
             <a:r>
-              <a:rPr lang="en-US" sz="2400">
+              <a:rPr lang="en-US" sz="2400" dirty="0">
                 <a:latin typeface="Gill Sans MT" charset="0"/>
                 <a:cs typeface="+mn-cs"/>
               </a:rPr>
@@ -16876,12 +16876,12 @@
           <a:effectLst/>
           <a:extLst>
             <a:ext uri="{909E8E84-426E-40dd-AFC4-6F175D3DCCD1}">
-              <a14:hiddenFill xmlns="" xmlns:a14="http://schemas.microsoft.com/office/drawing/2010/main">
+              <a14:hiddenFill xmlns:a14="http://schemas.microsoft.com/office/drawing/2010/main" xmlns="">
                 <a:noFill/>
               </a14:hiddenFill>
             </a:ext>
             <a:ext uri="{AF507438-7753-43e0-B8FC-AC1667EBCBE1}">
-              <a14:hiddenEffects xmlns="" xmlns:a14="http://schemas.microsoft.com/office/drawing/2010/main">
+              <a14:hiddenEffects xmlns:a14="http://schemas.microsoft.com/office/drawing/2010/main" xmlns="">
                 <a:effectLst>
                   <a:outerShdw blurRad="63500" dist="38099" dir="2700000" algn="ctr" rotWithShape="0">
                     <a:schemeClr val="bg2">
@@ -16934,12 +16934,12 @@
           <a:effectLst/>
           <a:extLst>
             <a:ext uri="{909E8E84-426E-40dd-AFC4-6F175D3DCCD1}">
-              <a14:hiddenFill xmlns="" xmlns:a14="http://schemas.microsoft.com/office/drawing/2010/main">
+              <a14:hiddenFill xmlns:a14="http://schemas.microsoft.com/office/drawing/2010/main" xmlns="">
                 <a:noFill/>
               </a14:hiddenFill>
             </a:ext>
             <a:ext uri="{AF507438-7753-43e0-B8FC-AC1667EBCBE1}">
-              <a14:hiddenEffects xmlns="" xmlns:a14="http://schemas.microsoft.com/office/drawing/2010/main">
+              <a14:hiddenEffects xmlns:a14="http://schemas.microsoft.com/office/drawing/2010/main" xmlns="">
                 <a:effectLst>
                   <a:outerShdw blurRad="63500" dist="38099" dir="2700000" algn="ctr" rotWithShape="0">
                     <a:schemeClr val="bg2">
@@ -16993,12 +16993,12 @@
           <a:effectLst/>
           <a:extLst>
             <a:ext uri="{909E8E84-426E-40dd-AFC4-6F175D3DCCD1}">
-              <a14:hiddenFill xmlns="" xmlns:a14="http://schemas.microsoft.com/office/drawing/2010/main">
+              <a14:hiddenFill xmlns:a14="http://schemas.microsoft.com/office/drawing/2010/main" xmlns="">
                 <a:noFill/>
               </a14:hiddenFill>
             </a:ext>
             <a:ext uri="{AF507438-7753-43e0-B8FC-AC1667EBCBE1}">
-              <a14:hiddenEffects xmlns="" xmlns:a14="http://schemas.microsoft.com/office/drawing/2010/main">
+              <a14:hiddenEffects xmlns:a14="http://schemas.microsoft.com/office/drawing/2010/main" xmlns="">
                 <a:effectLst>
                   <a:outerShdw blurRad="63500" dist="38099" dir="2700000" algn="ctr" rotWithShape="0">
                     <a:schemeClr val="bg2">
@@ -17051,12 +17051,12 @@
           <a:effectLst/>
           <a:extLst>
             <a:ext uri="{909E8E84-426E-40dd-AFC4-6F175D3DCCD1}">
-              <a14:hiddenFill xmlns="" xmlns:a14="http://schemas.microsoft.com/office/drawing/2010/main">
+              <a14:hiddenFill xmlns:a14="http://schemas.microsoft.com/office/drawing/2010/main" xmlns="">
                 <a:noFill/>
               </a14:hiddenFill>
             </a:ext>
             <a:ext uri="{AF507438-7753-43e0-B8FC-AC1667EBCBE1}">
-              <a14:hiddenEffects xmlns="" xmlns:a14="http://schemas.microsoft.com/office/drawing/2010/main">
+              <a14:hiddenEffects xmlns:a14="http://schemas.microsoft.com/office/drawing/2010/main" xmlns="">
                 <a:effectLst>
                   <a:outerShdw blurRad="63500" dist="38099" dir="2700000" algn="ctr" rotWithShape="0">
                     <a:schemeClr val="bg2">
@@ -17104,14 +17104,14 @@
           <a:effectLst/>
           <a:extLst>
             <a:ext uri="{909E8E84-426E-40dd-AFC4-6F175D3DCCD1}">
-              <a14:hiddenFill xmlns="" xmlns:a14="http://schemas.microsoft.com/office/drawing/2010/main">
+              <a14:hiddenFill xmlns:a14="http://schemas.microsoft.com/office/drawing/2010/main" xmlns="">
                 <a:solidFill>
                   <a:srgbClr val="FFFFFF"/>
                 </a:solidFill>
               </a14:hiddenFill>
             </a:ext>
             <a:ext uri="{91240B29-F687-4f45-9708-019B960494DF}">
-              <a14:hiddenLine xmlns="" xmlns:a14="http://schemas.microsoft.com/office/drawing/2010/main" w="9525">
+              <a14:hiddenLine xmlns:a14="http://schemas.microsoft.com/office/drawing/2010/main" xmlns="" w="9525">
                 <a:solidFill>
                   <a:schemeClr val="tx1"/>
                 </a:solidFill>
@@ -17121,7 +17121,7 @@
               </a14:hiddenLine>
             </a:ext>
             <a:ext uri="{AF507438-7753-43e0-B8FC-AC1667EBCBE1}">
-              <a14:hiddenEffects xmlns="" xmlns:a14="http://schemas.microsoft.com/office/drawing/2010/main">
+              <a14:hiddenEffects xmlns:a14="http://schemas.microsoft.com/office/drawing/2010/main" xmlns="">
                 <a:effectLst>
                   <a:outerShdw blurRad="63500" dist="38099" dir="2700000" algn="ctr" rotWithShape="0">
                     <a:schemeClr val="bg2">
@@ -17288,14 +17288,14 @@
           <a:effectLst/>
           <a:extLst>
             <a:ext uri="{909E8E84-426E-40dd-AFC4-6F175D3DCCD1}">
-              <a14:hiddenFill xmlns="" xmlns:a14="http://schemas.microsoft.com/office/drawing/2010/main">
+              <a14:hiddenFill xmlns:a14="http://schemas.microsoft.com/office/drawing/2010/main" xmlns="">
                 <a:solidFill>
                   <a:srgbClr val="FFFFFF"/>
                 </a:solidFill>
               </a14:hiddenFill>
             </a:ext>
             <a:ext uri="{91240B29-F687-4f45-9708-019B960494DF}">
-              <a14:hiddenLine xmlns="" xmlns:a14="http://schemas.microsoft.com/office/drawing/2010/main" w="9525">
+              <a14:hiddenLine xmlns:a14="http://schemas.microsoft.com/office/drawing/2010/main" xmlns="" w="9525">
                 <a:solidFill>
                   <a:schemeClr val="tx1"/>
                 </a:solidFill>
@@ -17305,7 +17305,7 @@
               </a14:hiddenLine>
             </a:ext>
             <a:ext uri="{AF507438-7753-43e0-B8FC-AC1667EBCBE1}">
-              <a14:hiddenEffects xmlns="" xmlns:a14="http://schemas.microsoft.com/office/drawing/2010/main">
+              <a14:hiddenEffects xmlns:a14="http://schemas.microsoft.com/office/drawing/2010/main" xmlns="">
                 <a:effectLst>
                   <a:outerShdw blurRad="63500" dist="38099" dir="2700000" algn="ctr" rotWithShape="0">
                     <a:schemeClr val="bg2">
@@ -17472,14 +17472,14 @@
           <a:effectLst/>
           <a:extLst>
             <a:ext uri="{909E8E84-426E-40dd-AFC4-6F175D3DCCD1}">
-              <a14:hiddenFill xmlns="" xmlns:a14="http://schemas.microsoft.com/office/drawing/2010/main">
+              <a14:hiddenFill xmlns:a14="http://schemas.microsoft.com/office/drawing/2010/main" xmlns="">
                 <a:solidFill>
                   <a:srgbClr val="FFFFFF"/>
                 </a:solidFill>
               </a14:hiddenFill>
             </a:ext>
             <a:ext uri="{91240B29-F687-4f45-9708-019B960494DF}">
-              <a14:hiddenLine xmlns="" xmlns:a14="http://schemas.microsoft.com/office/drawing/2010/main" w="9525">
+              <a14:hiddenLine xmlns:a14="http://schemas.microsoft.com/office/drawing/2010/main" xmlns="" w="9525">
                 <a:solidFill>
                   <a:schemeClr val="tx1"/>
                 </a:solidFill>
@@ -17489,7 +17489,7 @@
               </a14:hiddenLine>
             </a:ext>
             <a:ext uri="{AF507438-7753-43e0-B8FC-AC1667EBCBE1}">
-              <a14:hiddenEffects xmlns="" xmlns:a14="http://schemas.microsoft.com/office/drawing/2010/main">
+              <a14:hiddenEffects xmlns:a14="http://schemas.microsoft.com/office/drawing/2010/main" xmlns="">
                 <a:effectLst>
                   <a:outerShdw blurRad="63500" dist="38099" dir="2700000" algn="ctr" rotWithShape="0">
                     <a:schemeClr val="bg2">
@@ -17656,14 +17656,14 @@
           <a:effectLst/>
           <a:extLst>
             <a:ext uri="{909E8E84-426E-40dd-AFC4-6F175D3DCCD1}">
-              <a14:hiddenFill xmlns="" xmlns:a14="http://schemas.microsoft.com/office/drawing/2010/main">
+              <a14:hiddenFill xmlns:a14="http://schemas.microsoft.com/office/drawing/2010/main" xmlns="">
                 <a:solidFill>
                   <a:srgbClr val="FFFFFF"/>
                 </a:solidFill>
               </a14:hiddenFill>
             </a:ext>
             <a:ext uri="{91240B29-F687-4f45-9708-019B960494DF}">
-              <a14:hiddenLine xmlns="" xmlns:a14="http://schemas.microsoft.com/office/drawing/2010/main" w="9525">
+              <a14:hiddenLine xmlns:a14="http://schemas.microsoft.com/office/drawing/2010/main" xmlns="" w="9525">
                 <a:solidFill>
                   <a:schemeClr val="tx1"/>
                 </a:solidFill>
@@ -17673,7 +17673,7 @@
               </a14:hiddenLine>
             </a:ext>
             <a:ext uri="{AF507438-7753-43e0-B8FC-AC1667EBCBE1}">
-              <a14:hiddenEffects xmlns="" xmlns:a14="http://schemas.microsoft.com/office/drawing/2010/main">
+              <a14:hiddenEffects xmlns:a14="http://schemas.microsoft.com/office/drawing/2010/main" xmlns="">
                 <a:effectLst>
                   <a:outerShdw blurRad="63500" dist="38099" dir="2700000" algn="ctr" rotWithShape="0">
                     <a:schemeClr val="bg2">
@@ -17840,14 +17840,14 @@
           <a:effectLst/>
           <a:extLst>
             <a:ext uri="{909E8E84-426E-40dd-AFC4-6F175D3DCCD1}">
-              <a14:hiddenFill xmlns="" xmlns:a14="http://schemas.microsoft.com/office/drawing/2010/main">
+              <a14:hiddenFill xmlns:a14="http://schemas.microsoft.com/office/drawing/2010/main" xmlns="">
                 <a:solidFill>
                   <a:srgbClr val="FFFFFF"/>
                 </a:solidFill>
               </a14:hiddenFill>
             </a:ext>
             <a:ext uri="{91240B29-F687-4f45-9708-019B960494DF}">
-              <a14:hiddenLine xmlns="" xmlns:a14="http://schemas.microsoft.com/office/drawing/2010/main" w="9525">
+              <a14:hiddenLine xmlns:a14="http://schemas.microsoft.com/office/drawing/2010/main" xmlns="" w="9525">
                 <a:solidFill>
                   <a:schemeClr val="tx1"/>
                 </a:solidFill>
@@ -17857,7 +17857,7 @@
               </a14:hiddenLine>
             </a:ext>
             <a:ext uri="{AF507438-7753-43e0-B8FC-AC1667EBCBE1}">
-              <a14:hiddenEffects xmlns="" xmlns:a14="http://schemas.microsoft.com/office/drawing/2010/main">
+              <a14:hiddenEffects xmlns:a14="http://schemas.microsoft.com/office/drawing/2010/main" xmlns="">
                 <a:effectLst>
                   <a:outerShdw blurRad="63500" dist="38099" dir="2700000" algn="ctr" rotWithShape="0">
                     <a:schemeClr val="bg2">
@@ -18029,12 +18029,12 @@
           <a:effectLst/>
           <a:extLst>
             <a:ext uri="{909E8E84-426E-40dd-AFC4-6F175D3DCCD1}">
-              <a14:hiddenFill xmlns="" xmlns:a14="http://schemas.microsoft.com/office/drawing/2010/main">
+              <a14:hiddenFill xmlns:a14="http://schemas.microsoft.com/office/drawing/2010/main" xmlns="">
                 <a:noFill/>
               </a14:hiddenFill>
             </a:ext>
             <a:ext uri="{AF507438-7753-43e0-B8FC-AC1667EBCBE1}">
-              <a14:hiddenEffects xmlns="" xmlns:a14="http://schemas.microsoft.com/office/drawing/2010/main">
+              <a14:hiddenEffects xmlns:a14="http://schemas.microsoft.com/office/drawing/2010/main" xmlns="">
                 <a:effectLst>
                   <a:outerShdw blurRad="63500" dist="38099" dir="2700000" algn="ctr" rotWithShape="0">
                     <a:schemeClr val="bg2">
@@ -18082,14 +18082,14 @@
           <a:effectLst/>
           <a:extLst>
             <a:ext uri="{909E8E84-426E-40dd-AFC4-6F175D3DCCD1}">
-              <a14:hiddenFill xmlns="" xmlns:a14="http://schemas.microsoft.com/office/drawing/2010/main">
+              <a14:hiddenFill xmlns:a14="http://schemas.microsoft.com/office/drawing/2010/main" xmlns="">
                 <a:solidFill>
                   <a:srgbClr val="FFFFFF"/>
                 </a:solidFill>
               </a14:hiddenFill>
             </a:ext>
             <a:ext uri="{91240B29-F687-4f45-9708-019B960494DF}">
-              <a14:hiddenLine xmlns="" xmlns:a14="http://schemas.microsoft.com/office/drawing/2010/main" w="9525">
+              <a14:hiddenLine xmlns:a14="http://schemas.microsoft.com/office/drawing/2010/main" xmlns="" w="9525">
                 <a:solidFill>
                   <a:schemeClr val="tx1"/>
                 </a:solidFill>
@@ -18099,7 +18099,7 @@
               </a14:hiddenLine>
             </a:ext>
             <a:ext uri="{AF507438-7753-43e0-B8FC-AC1667EBCBE1}">
-              <a14:hiddenEffects xmlns="" xmlns:a14="http://schemas.microsoft.com/office/drawing/2010/main">
+              <a14:hiddenEffects xmlns:a14="http://schemas.microsoft.com/office/drawing/2010/main" xmlns="">
                 <a:effectLst>
                   <a:outerShdw blurRad="63500" dist="38099" dir="2700000" algn="ctr" rotWithShape="0">
                     <a:schemeClr val="bg2">
@@ -18271,12 +18271,12 @@
           <a:effectLst/>
           <a:extLst>
             <a:ext uri="{909E8E84-426E-40dd-AFC4-6F175D3DCCD1}">
-              <a14:hiddenFill xmlns="" xmlns:a14="http://schemas.microsoft.com/office/drawing/2010/main">
+              <a14:hiddenFill xmlns:a14="http://schemas.microsoft.com/office/drawing/2010/main" xmlns="">
                 <a:noFill/>
               </a14:hiddenFill>
             </a:ext>
             <a:ext uri="{AF507438-7753-43e0-B8FC-AC1667EBCBE1}">
-              <a14:hiddenEffects xmlns="" xmlns:a14="http://schemas.microsoft.com/office/drawing/2010/main">
+              <a14:hiddenEffects xmlns:a14="http://schemas.microsoft.com/office/drawing/2010/main" xmlns="">
                 <a:effectLst>
                   <a:outerShdw blurRad="63500" dist="38099" dir="2700000" algn="ctr" rotWithShape="0">
                     <a:schemeClr val="bg2">
@@ -18324,14 +18324,14 @@
           <a:effectLst/>
           <a:extLst>
             <a:ext uri="{909E8E84-426E-40dd-AFC4-6F175D3DCCD1}">
-              <a14:hiddenFill xmlns="" xmlns:a14="http://schemas.microsoft.com/office/drawing/2010/main">
+              <a14:hiddenFill xmlns:a14="http://schemas.microsoft.com/office/drawing/2010/main" xmlns="">
                 <a:solidFill>
                   <a:srgbClr val="FFFFFF"/>
                 </a:solidFill>
               </a14:hiddenFill>
             </a:ext>
             <a:ext uri="{91240B29-F687-4f45-9708-019B960494DF}">
-              <a14:hiddenLine xmlns="" xmlns:a14="http://schemas.microsoft.com/office/drawing/2010/main" w="9525">
+              <a14:hiddenLine xmlns:a14="http://schemas.microsoft.com/office/drawing/2010/main" xmlns="" w="9525">
                 <a:solidFill>
                   <a:schemeClr val="tx1"/>
                 </a:solidFill>
@@ -18341,7 +18341,7 @@
               </a14:hiddenLine>
             </a:ext>
             <a:ext uri="{AF507438-7753-43e0-B8FC-AC1667EBCBE1}">
-              <a14:hiddenEffects xmlns="" xmlns:a14="http://schemas.microsoft.com/office/drawing/2010/main">
+              <a14:hiddenEffects xmlns:a14="http://schemas.microsoft.com/office/drawing/2010/main" xmlns="">
                 <a:effectLst>
                   <a:outerShdw blurRad="63500" dist="38099" dir="2700000" algn="ctr" rotWithShape="0">
                     <a:schemeClr val="bg2">
@@ -18510,12 +18510,12 @@
           <a:effectLst/>
           <a:extLst>
             <a:ext uri="{909E8E84-426E-40dd-AFC4-6F175D3DCCD1}">
-              <a14:hiddenFill xmlns="" xmlns:a14="http://schemas.microsoft.com/office/drawing/2010/main">
+              <a14:hiddenFill xmlns:a14="http://schemas.microsoft.com/office/drawing/2010/main" xmlns="">
                 <a:noFill/>
               </a14:hiddenFill>
             </a:ext>
             <a:ext uri="{AF507438-7753-43e0-B8FC-AC1667EBCBE1}">
-              <a14:hiddenEffects xmlns="" xmlns:a14="http://schemas.microsoft.com/office/drawing/2010/main">
+              <a14:hiddenEffects xmlns:a14="http://schemas.microsoft.com/office/drawing/2010/main" xmlns="">
                 <a:effectLst>
                   <a:outerShdw blurRad="63500" dist="38099" dir="2700000" algn="ctr" rotWithShape="0">
                     <a:schemeClr val="bg2">
@@ -18563,14 +18563,14 @@
           <a:effectLst/>
           <a:extLst>
             <a:ext uri="{909E8E84-426E-40dd-AFC4-6F175D3DCCD1}">
-              <a14:hiddenFill xmlns="" xmlns:a14="http://schemas.microsoft.com/office/drawing/2010/main">
+              <a14:hiddenFill xmlns:a14="http://schemas.microsoft.com/office/drawing/2010/main" xmlns="">
                 <a:solidFill>
                   <a:srgbClr val="FFFFFF"/>
                 </a:solidFill>
               </a14:hiddenFill>
             </a:ext>
             <a:ext uri="{91240B29-F687-4f45-9708-019B960494DF}">
-              <a14:hiddenLine xmlns="" xmlns:a14="http://schemas.microsoft.com/office/drawing/2010/main" w="9525">
+              <a14:hiddenLine xmlns:a14="http://schemas.microsoft.com/office/drawing/2010/main" xmlns="" w="9525">
                 <a:solidFill>
                   <a:schemeClr val="tx1"/>
                 </a:solidFill>
@@ -18580,7 +18580,7 @@
               </a14:hiddenLine>
             </a:ext>
             <a:ext uri="{AF507438-7753-43e0-B8FC-AC1667EBCBE1}">
-              <a14:hiddenEffects xmlns="" xmlns:a14="http://schemas.microsoft.com/office/drawing/2010/main">
+              <a14:hiddenEffects xmlns:a14="http://schemas.microsoft.com/office/drawing/2010/main" xmlns="">
                 <a:effectLst>
                   <a:outerShdw blurRad="63500" dist="38099" dir="2700000" algn="ctr" rotWithShape="0">
                     <a:schemeClr val="bg2">
@@ -18752,12 +18752,12 @@
           <a:effectLst/>
           <a:extLst>
             <a:ext uri="{909E8E84-426E-40dd-AFC4-6F175D3DCCD1}">
-              <a14:hiddenFill xmlns="" xmlns:a14="http://schemas.microsoft.com/office/drawing/2010/main">
+              <a14:hiddenFill xmlns:a14="http://schemas.microsoft.com/office/drawing/2010/main" xmlns="">
                 <a:noFill/>
               </a14:hiddenFill>
             </a:ext>
             <a:ext uri="{AF507438-7753-43e0-B8FC-AC1667EBCBE1}">
-              <a14:hiddenEffects xmlns="" xmlns:a14="http://schemas.microsoft.com/office/drawing/2010/main">
+              <a14:hiddenEffects xmlns:a14="http://schemas.microsoft.com/office/drawing/2010/main" xmlns="">
                 <a:effectLst>
                   <a:outerShdw blurRad="63500" dist="38099" dir="2700000" algn="ctr" rotWithShape="0">
                     <a:schemeClr val="bg2">
@@ -18805,14 +18805,14 @@
           <a:effectLst/>
           <a:extLst>
             <a:ext uri="{909E8E84-426E-40dd-AFC4-6F175D3DCCD1}">
-              <a14:hiddenFill xmlns="" xmlns:a14="http://schemas.microsoft.com/office/drawing/2010/main">
+              <a14:hiddenFill xmlns:a14="http://schemas.microsoft.com/office/drawing/2010/main" xmlns="">
                 <a:solidFill>
                   <a:srgbClr val="FFFFFF"/>
                 </a:solidFill>
               </a14:hiddenFill>
             </a:ext>
             <a:ext uri="{91240B29-F687-4f45-9708-019B960494DF}">
-              <a14:hiddenLine xmlns="" xmlns:a14="http://schemas.microsoft.com/office/drawing/2010/main" w="9525">
+              <a14:hiddenLine xmlns:a14="http://schemas.microsoft.com/office/drawing/2010/main" xmlns="" w="9525">
                 <a:solidFill>
                   <a:schemeClr val="tx1"/>
                 </a:solidFill>
@@ -18822,7 +18822,7 @@
               </a14:hiddenLine>
             </a:ext>
             <a:ext uri="{AF507438-7753-43e0-B8FC-AC1667EBCBE1}">
-              <a14:hiddenEffects xmlns="" xmlns:a14="http://schemas.microsoft.com/office/drawing/2010/main">
+              <a14:hiddenEffects xmlns:a14="http://schemas.microsoft.com/office/drawing/2010/main" xmlns="">
                 <a:effectLst>
                   <a:outerShdw blurRad="63500" dist="38099" dir="2700000" algn="ctr" rotWithShape="0">
                     <a:schemeClr val="bg2">
@@ -18991,12 +18991,12 @@
           <a:effectLst/>
           <a:extLst>
             <a:ext uri="{909E8E84-426E-40dd-AFC4-6F175D3DCCD1}">
-              <a14:hiddenFill xmlns="" xmlns:a14="http://schemas.microsoft.com/office/drawing/2010/main">
+              <a14:hiddenFill xmlns:a14="http://schemas.microsoft.com/office/drawing/2010/main" xmlns="">
                 <a:noFill/>
               </a14:hiddenFill>
             </a:ext>
             <a:ext uri="{AF507438-7753-43e0-B8FC-AC1667EBCBE1}">
-              <a14:hiddenEffects xmlns="" xmlns:a14="http://schemas.microsoft.com/office/drawing/2010/main">
+              <a14:hiddenEffects xmlns:a14="http://schemas.microsoft.com/office/drawing/2010/main" xmlns="">
                 <a:effectLst>
                   <a:outerShdw blurRad="63500" dist="38099" dir="2700000" algn="ctr" rotWithShape="0">
                     <a:schemeClr val="bg2">
@@ -19049,12 +19049,12 @@
           <a:effectLst/>
           <a:extLst>
             <a:ext uri="{909E8E84-426E-40dd-AFC4-6F175D3DCCD1}">
-              <a14:hiddenFill xmlns="" xmlns:a14="http://schemas.microsoft.com/office/drawing/2010/main">
+              <a14:hiddenFill xmlns:a14="http://schemas.microsoft.com/office/drawing/2010/main" xmlns="">
                 <a:noFill/>
               </a14:hiddenFill>
             </a:ext>
             <a:ext uri="{AF507438-7753-43e0-B8FC-AC1667EBCBE1}">
-              <a14:hiddenEffects xmlns="" xmlns:a14="http://schemas.microsoft.com/office/drawing/2010/main">
+              <a14:hiddenEffects xmlns:a14="http://schemas.microsoft.com/office/drawing/2010/main" xmlns="">
                 <a:effectLst>
                   <a:outerShdw blurRad="63500" dist="38099" dir="2700000" algn="ctr" rotWithShape="0">
                     <a:schemeClr val="bg2">
@@ -19107,12 +19107,12 @@
           <a:effectLst/>
           <a:extLst>
             <a:ext uri="{909E8E84-426E-40dd-AFC4-6F175D3DCCD1}">
-              <a14:hiddenFill xmlns="" xmlns:a14="http://schemas.microsoft.com/office/drawing/2010/main">
+              <a14:hiddenFill xmlns:a14="http://schemas.microsoft.com/office/drawing/2010/main" xmlns="">
                 <a:noFill/>
               </a14:hiddenFill>
             </a:ext>
             <a:ext uri="{AF507438-7753-43e0-B8FC-AC1667EBCBE1}">
-              <a14:hiddenEffects xmlns="" xmlns:a14="http://schemas.microsoft.com/office/drawing/2010/main">
+              <a14:hiddenEffects xmlns:a14="http://schemas.microsoft.com/office/drawing/2010/main" xmlns="">
                 <a:effectLst>
                   <a:outerShdw blurRad="63500" dist="38099" dir="2700000" algn="ctr" rotWithShape="0">
                     <a:schemeClr val="bg2">
@@ -19940,14 +19940,14 @@
           </a:ln>
           <a:extLst>
             <a:ext uri="{909E8E84-426E-40dd-AFC4-6F175D3DCCD1}">
-              <a14:hiddenFill xmlns="" xmlns:a14="http://schemas.microsoft.com/office/drawing/2010/main">
+              <a14:hiddenFill xmlns:a14="http://schemas.microsoft.com/office/drawing/2010/main" xmlns="">
                 <a:solidFill>
                   <a:srgbClr val="FFFFFF"/>
                 </a:solidFill>
               </a14:hiddenFill>
             </a:ext>
             <a:ext uri="{91240B29-F687-4f45-9708-019B960494DF}">
-              <a14:hiddenLine xmlns="" xmlns:a14="http://schemas.microsoft.com/office/drawing/2010/main" w="9525">
+              <a14:hiddenLine xmlns:a14="http://schemas.microsoft.com/office/drawing/2010/main" xmlns="" w="9525">
                 <a:solidFill>
                   <a:srgbClr val="000000"/>
                 </a:solidFill>
@@ -20018,7 +20018,7 @@
               <a:defRPr/>
             </a:pPr>
             <a:r>
-              <a:rPr lang="en-US" i="1">
+              <a:rPr lang="en-US" i="1" dirty="0">
                 <a:solidFill>
                   <a:srgbClr val="000099"/>
                 </a:solidFill>
@@ -20033,7 +20033,7 @@
               <a:defRPr/>
             </a:pPr>
             <a:r>
-              <a:rPr lang="en-US">
+              <a:rPr lang="en-US" dirty="0">
                 <a:latin typeface="Gill Sans MT" charset="0"/>
                 <a:cs typeface="+mn-cs"/>
               </a:rPr>
@@ -20045,7 +20045,7 @@
               <a:defRPr/>
             </a:pPr>
             <a:r>
-              <a:rPr lang="en-US">
+              <a:rPr lang="en-US" dirty="0">
                 <a:latin typeface="Gill Sans MT" charset="0"/>
               </a:rPr>
               <a:t>do not want rate throttled by congestion control</a:t>
@@ -20056,7 +20056,7 @@
               <a:defRPr/>
             </a:pPr>
             <a:r>
-              <a:rPr lang="en-US">
+              <a:rPr lang="en-US" dirty="0">
                 <a:latin typeface="Gill Sans MT" charset="0"/>
                 <a:cs typeface="+mn-cs"/>
               </a:rPr>
@@ -20068,7 +20068,7 @@
               <a:defRPr/>
             </a:pPr>
             <a:r>
-              <a:rPr lang="en-US">
+              <a:rPr lang="en-US" dirty="0">
                 <a:latin typeface="Gill Sans MT" charset="0"/>
               </a:rPr>
               <a:t>send audio/video at constant rate, tolerate packet loss</a:t>
@@ -20078,7 +20078,7 @@
             <a:pPr>
               <a:defRPr/>
             </a:pPr>
-            <a:endParaRPr lang="en-US">
+            <a:endParaRPr lang="en-US" dirty="0">
               <a:latin typeface="Gill Sans MT" charset="0"/>
               <a:cs typeface="+mn-cs"/>
             </a:endParaRPr>
@@ -20191,7 +20191,7 @@
               <a:defRPr/>
             </a:pPr>
             <a:r>
-              <a:rPr lang="en-US" sz="2000">
+              <a:rPr lang="en-US" sz="2000" dirty="0">
                 <a:latin typeface="Gill Sans MT" charset="0"/>
               </a:rPr>
               <a:t>new app asks for 10 TCPs, gets R/2 </a:t>
@@ -20316,6 +20316,38 @@
               </a:rPr>
               <a:t>Transport Layer</a:t>
             </a:r>
+          </a:p>
+        </p:txBody>
+      </p:sp>
+      <p:sp>
+        <p:nvSpPr>
+          <p:cNvPr id="2" name="TextBox 1">
+            <a:extLst>
+              <a:ext uri="{FF2B5EF4-FFF2-40B4-BE49-F238E27FC236}">
+                <a16:creationId xmlns:a16="http://schemas.microsoft.com/office/drawing/2014/main" id="{8FB8C52A-56AC-594C-920C-4E5E6331BEF2}"/>
+              </a:ext>
+            </a:extLst>
+          </p:cNvPr>
+          <p:cNvSpPr txBox="1"/>
+          <p:nvPr/>
+        </p:nvSpPr>
+        <p:spPr>
+          <a:xfrm>
+            <a:off x="7817921" y="7590971"/>
+            <a:ext cx="184731" cy="338554"/>
+          </a:xfrm>
+          <a:prstGeom prst="rect">
+            <a:avLst/>
+          </a:prstGeom>
+          <a:noFill/>
+        </p:spPr>
+        <p:txBody>
+          <a:bodyPr wrap="none" rtlCol="0">
+            <a:spAutoFit/>
+          </a:bodyPr>
+          <a:lstStyle/>
+          <a:p>
+            <a:endParaRPr lang="en-US"/>
           </a:p>
         </p:txBody>
       </p:sp>
@@ -20577,7 +20609,7 @@
         <a:effectLst/>
         <a:extLst>
           <a:ext uri="{AF507438-7753-43e0-B8FC-AC1667EBCBE1}">
-            <a14:hiddenEffects xmlns="" xmlns:a14="http://schemas.microsoft.com/office/drawing/2010/main">
+            <a14:hiddenEffects xmlns:a14="http://schemas.microsoft.com/office/drawing/2010/main" xmlns="">
               <a:effectLst>
                 <a:outerShdw dist="35921" dir="2700000" algn="ctr" rotWithShape="0">
                   <a:schemeClr val="bg2"/>
@@ -20650,7 +20682,7 @@
         <a:effectLst/>
         <a:extLst>
           <a:ext uri="{AF507438-7753-43e0-B8FC-AC1667EBCBE1}">
-            <a14:hiddenEffects xmlns="" xmlns:a14="http://schemas.microsoft.com/office/drawing/2010/main">
+            <a14:hiddenEffects xmlns:a14="http://schemas.microsoft.com/office/drawing/2010/main" xmlns="">
               <a:effectLst>
                 <a:outerShdw dist="35921" dir="2700000" algn="ctr" rotWithShape="0">
                   <a:schemeClr val="bg2"/>

</xml_diff>